<commit_message>
Update slide 5 - Static Web Part I.pptx
</commit_message>
<xml_diff>
--- a/docs/slide 5 - Static Web Part I.pptx
+++ b/docs/slide 5 - Static Web Part I.pptx
@@ -241,7 +241,7 @@
           <a:p>
             <a:fld id="{872BFC85-49E4-447A-A7E3-16153CB2FE2A}" type="datetimeFigureOut">
               <a:rPr lang="en-US" smtClean="0"/>
-              <a:t>25-Sep-21</a:t>
+              <a:t>10/2/2021</a:t>
             </a:fld>
             <a:endParaRPr lang="en-US" dirty="0"/>
           </a:p>
@@ -418,7 +418,7 @@
           <a:p>
             <a:fld id="{1071B50E-4C60-4F9E-B773-52059170945B}" type="datetimeFigureOut">
               <a:rPr lang="en-US" noProof="0" smtClean="0"/>
-              <a:t>25-Sep-21</a:t>
+              <a:t>10/2/2021</a:t>
             </a:fld>
             <a:endParaRPr lang="en-US" noProof="0" dirty="0"/>
           </a:p>
@@ -899,7 +899,7 @@
           </a:lstStyle>
           <a:p>
             <a:r>
-              <a:rPr lang="en-US" noProof="0" smtClean="0"/>
+              <a:rPr lang="en-US" noProof="0"/>
               <a:t>Click icon to add picture</a:t>
             </a:r>
             <a:endParaRPr lang="en-US" noProof="0" dirty="0"/>
@@ -1127,7 +1127,7 @@
   <p:clrMapOvr>
     <a:masterClrMapping/>
   </p:clrMapOvr>
-  <p:extLst mod="1">
+  <p:extLst>
     <p:ext uri="{DCECCB84-F9BA-43D5-87BE-67443E8EF086}">
       <p15:sldGuideLst xmlns:p15="http://schemas.microsoft.com/office/powerpoint/2012/main">
         <p15:guide id="1" orient="horz" pos="2160" userDrawn="1">
@@ -1506,7 +1506,7 @@
   <p:clrMapOvr>
     <a:masterClrMapping/>
   </p:clrMapOvr>
-  <p:extLst mod="1">
+  <p:extLst>
     <p:ext uri="{DCECCB84-F9BA-43D5-87BE-67443E8EF086}">
       <p15:sldGuideLst xmlns:p15="http://schemas.microsoft.com/office/powerpoint/2012/main">
         <p15:guide id="1" orient="horz" pos="2160">
@@ -2150,7 +2150,7 @@
   <p:clrMapOvr>
     <a:masterClrMapping/>
   </p:clrMapOvr>
-  <p:extLst mod="1">
+  <p:extLst>
     <p:ext uri="{DCECCB84-F9BA-43D5-87BE-67443E8EF086}">
       <p15:sldGuideLst xmlns:p15="http://schemas.microsoft.com/office/powerpoint/2012/main">
         <p15:guide id="1" orient="horz" pos="2183">
@@ -2715,38 +2715,37 @@
           <a:p>
             <a:pPr lvl="0"/>
             <a:r>
-              <a:rPr lang="en-US" noProof="0" smtClean="0"/>
+              <a:rPr lang="en-US" noProof="0"/>
               <a:t>Edit Master text styles</a:t>
             </a:r>
           </a:p>
           <a:p>
             <a:pPr lvl="1"/>
             <a:r>
-              <a:rPr lang="en-US" noProof="0" smtClean="0"/>
+              <a:rPr lang="en-US" noProof="0"/>
               <a:t>Second level</a:t>
             </a:r>
           </a:p>
           <a:p>
             <a:pPr lvl="2"/>
             <a:r>
-              <a:rPr lang="en-US" noProof="0" smtClean="0"/>
+              <a:rPr lang="en-US" noProof="0"/>
               <a:t>Third level</a:t>
             </a:r>
           </a:p>
           <a:p>
             <a:pPr lvl="3"/>
             <a:r>
-              <a:rPr lang="en-US" noProof="0" smtClean="0"/>
+              <a:rPr lang="en-US" noProof="0"/>
               <a:t>Fourth level</a:t>
             </a:r>
           </a:p>
           <a:p>
             <a:pPr lvl="4"/>
             <a:r>
-              <a:rPr lang="en-US" noProof="0" smtClean="0"/>
+              <a:rPr lang="en-US" noProof="0"/>
               <a:t>Fifth level</a:t>
             </a:r>
-            <a:endParaRPr lang="en-US" noProof="0"/>
           </a:p>
         </p:txBody>
       </p:sp>
@@ -2760,7 +2759,7 @@
   <p:clrMapOvr>
     <a:masterClrMapping/>
   </p:clrMapOvr>
-  <p:extLst mod="1">
+  <p:extLst>
     <p:ext uri="{DCECCB84-F9BA-43D5-87BE-67443E8EF086}">
       <p15:sldGuideLst xmlns:p15="http://schemas.microsoft.com/office/powerpoint/2012/main">
         <p15:guide id="1" orient="horz" pos="2160">
@@ -3320,38 +3319,37 @@
           <a:p>
             <a:pPr lvl="0"/>
             <a:r>
-              <a:rPr lang="en-US" noProof="0" smtClean="0"/>
+              <a:rPr lang="en-US" noProof="0"/>
               <a:t>Edit Master text styles</a:t>
             </a:r>
           </a:p>
           <a:p>
             <a:pPr lvl="1"/>
             <a:r>
-              <a:rPr lang="en-US" noProof="0" smtClean="0"/>
+              <a:rPr lang="en-US" noProof="0"/>
               <a:t>Second level</a:t>
             </a:r>
           </a:p>
           <a:p>
             <a:pPr lvl="2"/>
             <a:r>
-              <a:rPr lang="en-US" noProof="0" smtClean="0"/>
+              <a:rPr lang="en-US" noProof="0"/>
               <a:t>Third level</a:t>
             </a:r>
           </a:p>
           <a:p>
             <a:pPr lvl="3"/>
             <a:r>
-              <a:rPr lang="en-US" noProof="0" smtClean="0"/>
+              <a:rPr lang="en-US" noProof="0"/>
               <a:t>Fourth level</a:t>
             </a:r>
           </a:p>
           <a:p>
             <a:pPr lvl="4"/>
             <a:r>
-              <a:rPr lang="en-US" noProof="0" smtClean="0"/>
+              <a:rPr lang="en-US" noProof="0"/>
               <a:t>Fifth level</a:t>
             </a:r>
-            <a:endParaRPr lang="en-US" noProof="0"/>
           </a:p>
         </p:txBody>
       </p:sp>
@@ -3437,38 +3435,37 @@
           <a:p>
             <a:pPr lvl="0"/>
             <a:r>
-              <a:rPr lang="en-US" noProof="0" smtClean="0"/>
+              <a:rPr lang="en-US" noProof="0"/>
               <a:t>Edit Master text styles</a:t>
             </a:r>
           </a:p>
           <a:p>
             <a:pPr lvl="1"/>
             <a:r>
-              <a:rPr lang="en-US" noProof="0" smtClean="0"/>
+              <a:rPr lang="en-US" noProof="0"/>
               <a:t>Second level</a:t>
             </a:r>
           </a:p>
           <a:p>
             <a:pPr lvl="2"/>
             <a:r>
-              <a:rPr lang="en-US" noProof="0" smtClean="0"/>
+              <a:rPr lang="en-US" noProof="0"/>
               <a:t>Third level</a:t>
             </a:r>
           </a:p>
           <a:p>
             <a:pPr lvl="3"/>
             <a:r>
-              <a:rPr lang="en-US" noProof="0" smtClean="0"/>
+              <a:rPr lang="en-US" noProof="0"/>
               <a:t>Fourth level</a:t>
             </a:r>
           </a:p>
           <a:p>
             <a:pPr lvl="4"/>
             <a:r>
-              <a:rPr lang="en-US" noProof="0" smtClean="0"/>
+              <a:rPr lang="en-US" noProof="0"/>
               <a:t>Fifth level</a:t>
             </a:r>
-            <a:endParaRPr lang="en-US" noProof="0"/>
           </a:p>
         </p:txBody>
       </p:sp>
@@ -3482,7 +3479,7 @@
   <p:clrMapOvr>
     <a:masterClrMapping/>
   </p:clrMapOvr>
-  <p:extLst mod="1">
+  <p:extLst>
     <p:ext uri="{DCECCB84-F9BA-43D5-87BE-67443E8EF086}">
       <p15:sldGuideLst xmlns:p15="http://schemas.microsoft.com/office/powerpoint/2012/main">
         <p15:guide id="1" orient="horz" pos="2160">
@@ -4000,7 +3997,7 @@
           <a:p>
             <a:pPr marL="228600" lvl="0" indent="-228600"/>
             <a:r>
-              <a:rPr lang="en-US" noProof="0" smtClean="0"/>
+              <a:rPr lang="en-US" noProof="0"/>
               <a:t>Edit Master text styles</a:t>
             </a:r>
           </a:p>
@@ -4078,7 +4075,7 @@
           <a:p>
             <a:pPr lvl="0"/>
             <a:r>
-              <a:rPr lang="en-US" noProof="0" smtClean="0"/>
+              <a:rPr lang="en-US" noProof="0"/>
               <a:t>Edit Master text styles</a:t>
             </a:r>
           </a:p>
@@ -4166,38 +4163,37 @@
           <a:p>
             <a:pPr lvl="0"/>
             <a:r>
-              <a:rPr lang="en-US" noProof="0" smtClean="0"/>
+              <a:rPr lang="en-US" noProof="0"/>
               <a:t>Edit Master text styles</a:t>
             </a:r>
           </a:p>
           <a:p>
             <a:pPr lvl="1"/>
             <a:r>
-              <a:rPr lang="en-US" noProof="0" smtClean="0"/>
+              <a:rPr lang="en-US" noProof="0"/>
               <a:t>Second level</a:t>
             </a:r>
           </a:p>
           <a:p>
             <a:pPr lvl="2"/>
             <a:r>
-              <a:rPr lang="en-US" noProof="0" smtClean="0"/>
+              <a:rPr lang="en-US" noProof="0"/>
               <a:t>Third level</a:t>
             </a:r>
           </a:p>
           <a:p>
             <a:pPr lvl="3"/>
             <a:r>
-              <a:rPr lang="en-US" noProof="0" smtClean="0"/>
+              <a:rPr lang="en-US" noProof="0"/>
               <a:t>Fourth level</a:t>
             </a:r>
           </a:p>
           <a:p>
             <a:pPr lvl="4"/>
             <a:r>
-              <a:rPr lang="en-US" noProof="0" smtClean="0"/>
+              <a:rPr lang="en-US" noProof="0"/>
               <a:t>Fifth level</a:t>
             </a:r>
-            <a:endParaRPr lang="en-US" noProof="0"/>
           </a:p>
         </p:txBody>
       </p:sp>
@@ -4283,38 +4279,37 @@
           <a:p>
             <a:pPr lvl="0"/>
             <a:r>
-              <a:rPr lang="en-US" noProof="0" smtClean="0"/>
+              <a:rPr lang="en-US" noProof="0"/>
               <a:t>Edit Master text styles</a:t>
             </a:r>
           </a:p>
           <a:p>
             <a:pPr lvl="1"/>
             <a:r>
-              <a:rPr lang="en-US" noProof="0" smtClean="0"/>
+              <a:rPr lang="en-US" noProof="0"/>
               <a:t>Second level</a:t>
             </a:r>
           </a:p>
           <a:p>
             <a:pPr lvl="2"/>
             <a:r>
-              <a:rPr lang="en-US" noProof="0" smtClean="0"/>
+              <a:rPr lang="en-US" noProof="0"/>
               <a:t>Third level</a:t>
             </a:r>
           </a:p>
           <a:p>
             <a:pPr lvl="3"/>
             <a:r>
-              <a:rPr lang="en-US" noProof="0" smtClean="0"/>
+              <a:rPr lang="en-US" noProof="0"/>
               <a:t>Fourth level</a:t>
             </a:r>
           </a:p>
           <a:p>
             <a:pPr lvl="4"/>
             <a:r>
-              <a:rPr lang="en-US" noProof="0" smtClean="0"/>
+              <a:rPr lang="en-US" noProof="0"/>
               <a:t>Fifth level</a:t>
             </a:r>
-            <a:endParaRPr lang="en-US" noProof="0"/>
           </a:p>
         </p:txBody>
       </p:sp>
@@ -4328,7 +4323,7 @@
   <p:clrMapOvr>
     <a:masterClrMapping/>
   </p:clrMapOvr>
-  <p:extLst mod="1">
+  <p:extLst>
     <p:ext uri="{DCECCB84-F9BA-43D5-87BE-67443E8EF086}">
       <p15:sldGuideLst xmlns:p15="http://schemas.microsoft.com/office/powerpoint/2012/main">
         <p15:guide id="1" orient="horz" pos="2160">
@@ -4683,7 +4678,7 @@
           <a:p>
             <a:pPr lvl="0"/>
             <a:r>
-              <a:rPr lang="en-US" noProof="0" smtClean="0"/>
+              <a:rPr lang="en-US" noProof="0"/>
               <a:t>Edit Master text styles</a:t>
             </a:r>
           </a:p>
@@ -4763,38 +4758,37 @@
           <a:p>
             <a:pPr lvl="0"/>
             <a:r>
-              <a:rPr lang="en-US" noProof="0" smtClean="0"/>
+              <a:rPr lang="en-US" noProof="0"/>
               <a:t>Edit Master text styles</a:t>
             </a:r>
           </a:p>
           <a:p>
             <a:pPr lvl="1"/>
             <a:r>
-              <a:rPr lang="en-US" noProof="0" smtClean="0"/>
+              <a:rPr lang="en-US" noProof="0"/>
               <a:t>Second level</a:t>
             </a:r>
           </a:p>
           <a:p>
             <a:pPr lvl="2"/>
             <a:r>
-              <a:rPr lang="en-US" noProof="0" smtClean="0"/>
+              <a:rPr lang="en-US" noProof="0"/>
               <a:t>Third level</a:t>
             </a:r>
           </a:p>
           <a:p>
             <a:pPr lvl="3"/>
             <a:r>
-              <a:rPr lang="en-US" noProof="0" smtClean="0"/>
+              <a:rPr lang="en-US" noProof="0"/>
               <a:t>Fourth level</a:t>
             </a:r>
           </a:p>
           <a:p>
             <a:pPr lvl="4"/>
             <a:r>
-              <a:rPr lang="en-US" noProof="0" smtClean="0"/>
+              <a:rPr lang="en-US" noProof="0"/>
               <a:t>Fifth level</a:t>
             </a:r>
-            <a:endParaRPr lang="en-US" noProof="0"/>
           </a:p>
         </p:txBody>
       </p:sp>
@@ -4808,7 +4802,7 @@
   <p:clrMapOvr>
     <a:masterClrMapping/>
   </p:clrMapOvr>
-  <p:extLst mod="1">
+  <p:extLst>
     <p:ext uri="{DCECCB84-F9BA-43D5-87BE-67443E8EF086}">
       <p15:sldGuideLst xmlns:p15="http://schemas.microsoft.com/office/powerpoint/2012/main">
         <p15:guide id="1" orient="horz" pos="2160">
@@ -5173,7 +5167,7 @@
           <a:p>
             <a:pPr lvl="0"/>
             <a:r>
-              <a:rPr lang="en-US" noProof="0" smtClean="0"/>
+              <a:rPr lang="en-US" noProof="0"/>
               <a:t>Edit Master text styles</a:t>
             </a:r>
           </a:p>
@@ -5246,7 +5240,7 @@
           </a:lstStyle>
           <a:p>
             <a:r>
-              <a:rPr lang="en-US" noProof="0" smtClean="0"/>
+              <a:rPr lang="en-US" noProof="0"/>
               <a:t>Click icon to add picture</a:t>
             </a:r>
             <a:endParaRPr lang="en-US" noProof="0" dirty="0"/>
@@ -5263,7 +5257,7 @@
   <p:clrMapOvr>
     <a:masterClrMapping/>
   </p:clrMapOvr>
-  <p:extLst mod="1">
+  <p:extLst>
     <p:ext uri="{DCECCB84-F9BA-43D5-87BE-67443E8EF086}">
       <p15:sldGuideLst xmlns:p15="http://schemas.microsoft.com/office/powerpoint/2012/main">
         <p15:guide id="1" orient="horz" pos="2160">
@@ -5668,7 +5662,7 @@
   <p:clrMapOvr>
     <a:masterClrMapping/>
   </p:clrMapOvr>
-  <p:extLst mod="1">
+  <p:extLst>
     <p:ext uri="{DCECCB84-F9BA-43D5-87BE-67443E8EF086}">
       <p15:sldGuideLst xmlns:p15="http://schemas.microsoft.com/office/powerpoint/2012/main">
         <p15:guide id="1" orient="horz" pos="142">
@@ -6099,7 +6093,7 @@
   <p:clrMapOvr>
     <a:masterClrMapping/>
   </p:clrMapOvr>
-  <p:extLst mod="1">
+  <p:extLst>
     <p:ext uri="{DCECCB84-F9BA-43D5-87BE-67443E8EF086}">
       <p15:sldGuideLst xmlns:p15="http://schemas.microsoft.com/office/powerpoint/2012/main">
         <p15:guide id="1" orient="horz" pos="142">
@@ -6162,7 +6156,7 @@
           <a:lstStyle/>
           <a:p>
             <a:r>
-              <a:rPr lang="en-US" smtClean="0"/>
+              <a:rPr lang="en-US"/>
               <a:t>Click to edit Master title style</a:t>
             </a:r>
             <a:endParaRPr lang="en-US" dirty="0"/>
@@ -6775,7 +6769,7 @@
           </a:lstStyle>
           <a:p>
             <a:r>
-              <a:rPr lang="en-US" noProof="0" smtClean="0"/>
+              <a:rPr lang="en-US" noProof="0"/>
               <a:t>Click icon to add picture</a:t>
             </a:r>
             <a:endParaRPr lang="en-US" noProof="0" dirty="0"/>
@@ -6891,7 +6885,7 @@
   <p:clrMapOvr>
     <a:masterClrMapping/>
   </p:clrMapOvr>
-  <p:extLst mod="1">
+  <p:extLst>
     <p:ext uri="{DCECCB84-F9BA-43D5-87BE-67443E8EF086}">
       <p15:sldGuideLst xmlns:p15="http://schemas.microsoft.com/office/powerpoint/2012/main">
         <p15:guide id="1" orient="horz" pos="2183" userDrawn="1">
@@ -7031,38 +7025,37 @@
           <a:p>
             <a:pPr lvl="0"/>
             <a:r>
-              <a:rPr lang="en-US" noProof="0" smtClean="0"/>
+              <a:rPr lang="en-US" noProof="0"/>
               <a:t>Edit Master text styles</a:t>
             </a:r>
           </a:p>
           <a:p>
             <a:pPr lvl="1"/>
             <a:r>
-              <a:rPr lang="en-US" noProof="0" smtClean="0"/>
+              <a:rPr lang="en-US" noProof="0"/>
               <a:t>Second level</a:t>
             </a:r>
           </a:p>
           <a:p>
             <a:pPr lvl="2"/>
             <a:r>
-              <a:rPr lang="en-US" noProof="0" smtClean="0"/>
+              <a:rPr lang="en-US" noProof="0"/>
               <a:t>Third level</a:t>
             </a:r>
           </a:p>
           <a:p>
             <a:pPr lvl="3"/>
             <a:r>
-              <a:rPr lang="en-US" noProof="0" smtClean="0"/>
+              <a:rPr lang="en-US" noProof="0"/>
               <a:t>Fourth level</a:t>
             </a:r>
           </a:p>
           <a:p>
             <a:pPr lvl="4"/>
             <a:r>
-              <a:rPr lang="en-US" noProof="0" smtClean="0"/>
+              <a:rPr lang="en-US" noProof="0"/>
               <a:t>Fifth level</a:t>
             </a:r>
-            <a:endParaRPr lang="en-US" noProof="0"/>
           </a:p>
         </p:txBody>
       </p:sp>
@@ -7511,7 +7504,7 @@
           </a:lstStyle>
           <a:p>
             <a:r>
-              <a:rPr lang="en-US" noProof="0" smtClean="0"/>
+              <a:rPr lang="en-US" noProof="0"/>
               <a:t>Click icon to add picture</a:t>
             </a:r>
             <a:endParaRPr lang="en-US" noProof="0" dirty="0"/>
@@ -7585,7 +7578,7 @@
   <p:clrMapOvr>
     <a:masterClrMapping/>
   </p:clrMapOvr>
-  <p:extLst mod="1">
+  <p:extLst>
     <p:ext uri="{DCECCB84-F9BA-43D5-87BE-67443E8EF086}">
       <p15:sldGuideLst xmlns:p15="http://schemas.microsoft.com/office/powerpoint/2012/main">
         <p15:guide id="1" orient="horz" pos="142">
@@ -7759,7 +7752,7 @@
           </a:lstStyle>
           <a:p>
             <a:r>
-              <a:rPr lang="en-US" noProof="0" smtClean="0"/>
+              <a:rPr lang="en-US" noProof="0"/>
               <a:t>Click icon to add picture</a:t>
             </a:r>
             <a:endParaRPr lang="en-US" noProof="0" dirty="0"/>
@@ -7850,38 +7843,37 @@
           <a:p>
             <a:pPr lvl="0"/>
             <a:r>
-              <a:rPr lang="en-US" noProof="0" smtClean="0"/>
+              <a:rPr lang="en-US" noProof="0"/>
               <a:t>Edit Master text styles</a:t>
             </a:r>
           </a:p>
           <a:p>
             <a:pPr lvl="1"/>
             <a:r>
-              <a:rPr lang="en-US" noProof="0" smtClean="0"/>
+              <a:rPr lang="en-US" noProof="0"/>
               <a:t>Second level</a:t>
             </a:r>
           </a:p>
           <a:p>
             <a:pPr lvl="2"/>
             <a:r>
-              <a:rPr lang="en-US" noProof="0" smtClean="0"/>
+              <a:rPr lang="en-US" noProof="0"/>
               <a:t>Third level</a:t>
             </a:r>
           </a:p>
           <a:p>
             <a:pPr lvl="3"/>
             <a:r>
-              <a:rPr lang="en-US" noProof="0" smtClean="0"/>
+              <a:rPr lang="en-US" noProof="0"/>
               <a:t>Fourth level</a:t>
             </a:r>
           </a:p>
           <a:p>
             <a:pPr lvl="4"/>
             <a:r>
-              <a:rPr lang="en-US" noProof="0" smtClean="0"/>
+              <a:rPr lang="en-US" noProof="0"/>
               <a:t>Fifth level</a:t>
             </a:r>
-            <a:endParaRPr lang="en-US" noProof="0"/>
           </a:p>
         </p:txBody>
       </p:sp>
@@ -8197,7 +8189,7 @@
   <p:clrMapOvr>
     <a:masterClrMapping/>
   </p:clrMapOvr>
-  <p:extLst mod="1">
+  <p:extLst>
     <p:ext uri="{DCECCB84-F9BA-43D5-87BE-67443E8EF086}">
       <p15:sldGuideLst xmlns:p15="http://schemas.microsoft.com/office/powerpoint/2012/main">
         <p15:guide id="1" orient="horz" pos="142">
@@ -8539,7 +8531,7 @@
           <a:p>
             <a:pPr lvl="0"/>
             <a:r>
-              <a:rPr lang="en-US" noProof="0" smtClean="0"/>
+              <a:rPr lang="en-US" noProof="0"/>
               <a:t>Edit Master text styles</a:t>
             </a:r>
           </a:p>
@@ -8618,7 +8610,7 @@
               </a:buClr>
             </a:pPr>
             <a:r>
-              <a:rPr lang="en-US" noProof="0" smtClean="0"/>
+              <a:rPr lang="en-US" noProof="0"/>
               <a:t>Edit Master text styles</a:t>
             </a:r>
           </a:p>
@@ -8629,7 +8621,7 @@
               </a:buClr>
             </a:pPr>
             <a:r>
-              <a:rPr lang="en-US" noProof="0" smtClean="0"/>
+              <a:rPr lang="en-US" noProof="0"/>
               <a:t>Second level</a:t>
             </a:r>
           </a:p>
@@ -8640,7 +8632,7 @@
               </a:buClr>
             </a:pPr>
             <a:r>
-              <a:rPr lang="en-US" noProof="0" smtClean="0"/>
+              <a:rPr lang="en-US" noProof="0"/>
               <a:t>Third level</a:t>
             </a:r>
           </a:p>
@@ -8651,7 +8643,7 @@
               </a:buClr>
             </a:pPr>
             <a:r>
-              <a:rPr lang="en-US" noProof="0" smtClean="0"/>
+              <a:rPr lang="en-US" noProof="0"/>
               <a:t>Fourth level</a:t>
             </a:r>
           </a:p>
@@ -8662,10 +8654,9 @@
               </a:buClr>
             </a:pPr>
             <a:r>
-              <a:rPr lang="en-US" noProof="0" smtClean="0"/>
+              <a:rPr lang="en-US" noProof="0"/>
               <a:t>Fifth level</a:t>
             </a:r>
-            <a:endParaRPr lang="en-US" noProof="0"/>
           </a:p>
         </p:txBody>
       </p:sp>
@@ -8746,7 +8737,7 @@
           <a:p>
             <a:pPr lvl="0"/>
             <a:r>
-              <a:rPr lang="en-US" noProof="0" smtClean="0"/>
+              <a:rPr lang="en-US" noProof="0"/>
               <a:t>Edit Master text styles</a:t>
             </a:r>
           </a:p>
@@ -8825,7 +8816,7 @@
               </a:buClr>
             </a:pPr>
             <a:r>
-              <a:rPr lang="en-US" noProof="0" smtClean="0"/>
+              <a:rPr lang="en-US" noProof="0"/>
               <a:t>Edit Master text styles</a:t>
             </a:r>
           </a:p>
@@ -8836,7 +8827,7 @@
               </a:buClr>
             </a:pPr>
             <a:r>
-              <a:rPr lang="en-US" noProof="0" smtClean="0"/>
+              <a:rPr lang="en-US" noProof="0"/>
               <a:t>Second level</a:t>
             </a:r>
           </a:p>
@@ -8847,7 +8838,7 @@
               </a:buClr>
             </a:pPr>
             <a:r>
-              <a:rPr lang="en-US" noProof="0" smtClean="0"/>
+              <a:rPr lang="en-US" noProof="0"/>
               <a:t>Third level</a:t>
             </a:r>
           </a:p>
@@ -8858,7 +8849,7 @@
               </a:buClr>
             </a:pPr>
             <a:r>
-              <a:rPr lang="en-US" noProof="0" smtClean="0"/>
+              <a:rPr lang="en-US" noProof="0"/>
               <a:t>Fourth level</a:t>
             </a:r>
           </a:p>
@@ -8869,10 +8860,9 @@
               </a:buClr>
             </a:pPr>
             <a:r>
-              <a:rPr lang="en-US" noProof="0" smtClean="0"/>
+              <a:rPr lang="en-US" noProof="0"/>
               <a:t>Fifth level</a:t>
             </a:r>
-            <a:endParaRPr lang="en-US" noProof="0"/>
           </a:p>
         </p:txBody>
       </p:sp>
@@ -9142,7 +9132,7 @@
   <p:clrMapOvr>
     <a:masterClrMapping/>
   </p:clrMapOvr>
-  <p:extLst mod="1">
+  <p:extLst>
     <p:ext uri="{DCECCB84-F9BA-43D5-87BE-67443E8EF086}">
       <p15:sldGuideLst xmlns:p15="http://schemas.microsoft.com/office/powerpoint/2012/main">
         <p15:guide id="1" orient="horz" pos="2160">
@@ -9745,7 +9735,7 @@
           <a:p>
             <a:pPr lvl="0"/>
             <a:r>
-              <a:rPr lang="en-US" noProof="0" smtClean="0"/>
+              <a:rPr lang="en-US" noProof="0"/>
               <a:t>Click icon to add chart</a:t>
             </a:r>
             <a:endParaRPr lang="en-US" noProof="0" dirty="0"/>
@@ -9762,7 +9752,7 @@
   <p:clrMapOvr>
     <a:masterClrMapping/>
   </p:clrMapOvr>
-  <p:extLst mod="1">
+  <p:extLst>
     <p:ext uri="{DCECCB84-F9BA-43D5-87BE-67443E8EF086}">
       <p15:sldGuideLst xmlns:p15="http://schemas.microsoft.com/office/powerpoint/2012/main">
         <p15:guide id="1" orient="horz" pos="142">
@@ -9846,7 +9836,7 @@
           <a:p>
             <a:pPr lvl="0"/>
             <a:r>
-              <a:rPr lang="en-US" noProof="0" smtClean="0"/>
+              <a:rPr lang="en-US" noProof="0"/>
               <a:t>Click icon to add table</a:t>
             </a:r>
             <a:endParaRPr lang="en-US" noProof="0" dirty="0"/>
@@ -10293,7 +10283,7 @@
   <p:clrMapOvr>
     <a:masterClrMapping/>
   </p:clrMapOvr>
-  <p:extLst mod="1">
+  <p:extLst>
     <p:ext uri="{DCECCB84-F9BA-43D5-87BE-67443E8EF086}">
       <p15:sldGuideLst xmlns:p15="http://schemas.microsoft.com/office/powerpoint/2012/main">
         <p15:guide id="1" orient="horz" pos="142">
@@ -10541,7 +10531,7 @@
   <p:clrMapOvr>
     <a:masterClrMapping/>
   </p:clrMapOvr>
-  <p:extLst mod="1">
+  <p:extLst>
     <p:ext uri="{DCECCB84-F9BA-43D5-87BE-67443E8EF086}">
       <p15:sldGuideLst xmlns:p15="http://schemas.microsoft.com/office/powerpoint/2012/main">
         <p15:guide id="1" orient="horz" pos="2160" userDrawn="1">
@@ -12412,7 +12402,7 @@
           </a:lstStyle>
           <a:p>
             <a:r>
-              <a:rPr lang="en-US" noProof="0" smtClean="0"/>
+              <a:rPr lang="en-US" noProof="0"/>
               <a:t>Click icon to add picture</a:t>
             </a:r>
             <a:endParaRPr lang="en-US" noProof="0" dirty="0"/>
@@ -12429,7 +12419,7 @@
   <p:clrMapOvr>
     <a:masterClrMapping/>
   </p:clrMapOvr>
-  <p:extLst mod="1">
+  <p:extLst>
     <p:ext uri="{DCECCB84-F9BA-43D5-87BE-67443E8EF086}">
       <p15:sldGuideLst xmlns:p15="http://schemas.microsoft.com/office/powerpoint/2012/main">
         <p15:guide id="1" orient="horz" pos="2160">
@@ -12617,10 +12607,9 @@
           <a:lstStyle/>
           <a:p>
             <a:r>
-              <a:rPr lang="en-US" noProof="0" smtClean="0"/>
+              <a:rPr lang="en-US" noProof="0"/>
               <a:t>Click to edit Master title style</a:t>
             </a:r>
-            <a:endParaRPr lang="en-US" noProof="0"/>
           </a:p>
         </p:txBody>
       </p:sp>
@@ -12993,22 +12982,13 @@
           <a:lstStyle/>
           <a:p>
             <a:r>
-              <a:rPr lang="en-US" dirty="0" smtClean="0"/>
-              <a:t>BUILD WEB APPLICATION </a:t>
-            </a:r>
-            <a:r>
               <a:rPr lang="en-US" dirty="0"/>
-              <a:t>FROM </a:t>
-            </a:r>
-            <a:r>
-              <a:rPr lang="en-US" dirty="0" smtClean="0"/>
-              <a:t>SCRATCH </a:t>
-            </a:r>
-            <a:r>
-              <a:rPr lang="en-US" sz="1400" dirty="0" smtClean="0"/>
+              <a:t>BUILD WEB APPLICATION FROM SCRATCH </a:t>
+            </a:r>
+            <a:r>
+              <a:rPr lang="en-US" sz="1400" dirty="0"/>
               <a:t>by</a:t>
             </a:r>
-            <a:endParaRPr lang="en-US" sz="1400" dirty="0"/>
           </a:p>
         </p:txBody>
       </p:sp>
@@ -13034,36 +13014,36 @@
           <a:lstStyle/>
           <a:p>
             <a:r>
-              <a:rPr lang="en-US" dirty="0" smtClean="0"/>
+              <a:rPr lang="en-US" dirty="0"/>
               <a:t>Aditya </a:t>
             </a:r>
             <a:r>
-              <a:rPr lang="en-US" dirty="0" err="1" smtClean="0"/>
+              <a:rPr lang="en-US" dirty="0" err="1"/>
               <a:t>Dharmawan</a:t>
             </a:r>
             <a:r>
-              <a:rPr lang="en-US" dirty="0" smtClean="0"/>
+              <a:rPr lang="en-US" dirty="0"/>
               <a:t> </a:t>
             </a:r>
             <a:r>
-              <a:rPr lang="en-US" dirty="0" err="1" smtClean="0"/>
+              <a:rPr lang="en-US" dirty="0" err="1"/>
               <a:t>Saputra</a:t>
             </a:r>
-            <a:endParaRPr lang="en-US" dirty="0" smtClean="0"/>
-          </a:p>
-          <a:p>
-            <a:r>
-              <a:rPr lang="en-US" dirty="0" smtClean="0"/>
+            <a:endParaRPr lang="en-US" dirty="0"/>
+          </a:p>
+          <a:p>
+            <a:r>
+              <a:rPr lang="en-US" dirty="0"/>
               <a:t>WEB DEVELOPER</a:t>
             </a:r>
           </a:p>
           <a:p>
             <a:r>
-              <a:rPr lang="en-US" sz="1100" dirty="0" smtClean="0"/>
+              <a:rPr lang="en-US" sz="1100" dirty="0"/>
               <a:t>@</a:t>
             </a:r>
             <a:r>
-              <a:rPr lang="en-US" sz="1100" dirty="0" err="1" smtClean="0"/>
+              <a:rPr lang="en-US" sz="1100" dirty="0" err="1"/>
               <a:t>adityadees</a:t>
             </a:r>
             <a:endParaRPr lang="en-US" sz="1100" dirty="0"/>
@@ -13179,16 +13159,15 @@
           <a:lstStyle/>
           <a:p>
             <a:r>
-              <a:rPr lang="en-US" dirty="0" smtClean="0"/>
+              <a:rPr lang="en-US" dirty="0"/>
               <a:t>FAKULTAS ILMU KOMPUTER</a:t>
             </a:r>
           </a:p>
           <a:p>
             <a:r>
-              <a:rPr lang="en-US" dirty="0" smtClean="0"/>
+              <a:rPr lang="en-US" dirty="0"/>
               <a:t>UNIVERSITAS SRIWIJAYA</a:t>
             </a:r>
-            <a:endParaRPr lang="en-US" dirty="0"/>
           </a:p>
         </p:txBody>
       </p:sp>
@@ -13215,10 +13194,9 @@
           <a:lstStyle/>
           <a:p>
             <a:r>
-              <a:rPr lang="en-US" dirty="0" smtClean="0"/>
+              <a:rPr lang="en-US" dirty="0"/>
               <a:t>UNSRI MENGAJAR 2021</a:t>
             </a:r>
-            <a:endParaRPr lang="en-US" dirty="0"/>
           </a:p>
         </p:txBody>
       </p:sp>
@@ -13245,18 +13223,9 @@
           <a:lstStyle/>
           <a:p>
             <a:r>
-              <a:rPr lang="en-US" dirty="0" smtClean="0"/>
-              <a:t>LARAVEL </a:t>
-            </a:r>
-            <a:r>
               <a:rPr lang="en-US" dirty="0"/>
-              <a:t>– BOOTSTRAP </a:t>
-            </a:r>
-            <a:r>
-              <a:rPr lang="en-US" dirty="0" smtClean="0"/>
-              <a:t>- MYSQL</a:t>
-            </a:r>
-            <a:endParaRPr lang="en-US" dirty="0"/>
+              <a:t>LARAVEL – BOOTSTRAP - MYSQL</a:t>
+            </a:r>
           </a:p>
         </p:txBody>
       </p:sp>
@@ -13283,16 +13252,8 @@
           <a:lstStyle/>
           <a:p>
             <a:r>
-              <a:rPr lang="en-US" dirty="0" smtClean="0"/>
-              <a:t>BAB </a:t>
-            </a:r>
-            <a:r>
               <a:rPr lang="en-US" dirty="0"/>
-              <a:t>V</a:t>
-            </a:r>
-            <a:r>
-              <a:rPr lang="en-US" dirty="0" smtClean="0"/>
-              <a:t> : Static Web Part I</a:t>
+              <a:t>BAB V : Static Web Part I</a:t>
             </a:r>
           </a:p>
         </p:txBody>
@@ -13430,13 +13391,6 @@
   <p:clrMapOvr>
     <a:masterClrMapping/>
   </p:clrMapOvr>
-  <p:timing>
-    <p:tnLst>
-      <p:par>
-        <p:cTn id="1" dur="indefinite" restart="never" nodeType="tmRoot"/>
-      </p:par>
-    </p:tnLst>
-  </p:timing>
 </p:sld>
 </file>
 
@@ -13481,7 +13435,7 @@
           <a:lstStyle/>
           <a:p>
             <a:r>
-              <a:rPr lang="en-US" dirty="0" smtClean="0"/>
+              <a:rPr lang="en-US" dirty="0"/>
               <a:t>Styling</a:t>
             </a:r>
             <a:endParaRPr lang="en-US" b="0" dirty="0"/>
@@ -13511,13 +13465,8 @@
           <a:p>
             <a:r>
               <a:rPr lang="en-US" dirty="0"/>
-              <a:t>Static Web – </a:t>
-            </a:r>
-            <a:r>
-              <a:rPr lang="en-US" dirty="0" smtClean="0"/>
-              <a:t>Styling</a:t>
-            </a:r>
-            <a:endParaRPr lang="en-US" dirty="0"/>
+              <a:t>Static Web – Styling</a:t>
+            </a:r>
           </a:p>
         </p:txBody>
       </p:sp>
@@ -13836,94 +13785,94 @@
           </a:lstStyle>
           <a:p>
             <a:r>
-              <a:rPr lang="es-ES" dirty="0" smtClean="0"/>
+              <a:rPr lang="es-ES" dirty="0"/>
               <a:t>9. </a:t>
             </a:r>
             <a:r>
-              <a:rPr lang="es-ES" dirty="0" err="1" smtClean="0"/>
+              <a:rPr lang="es-ES" dirty="0" err="1"/>
               <a:t>Kembali</a:t>
             </a:r>
             <a:r>
-              <a:rPr lang="es-ES" dirty="0" smtClean="0"/>
+              <a:rPr lang="es-ES" dirty="0"/>
               <a:t> </a:t>
             </a:r>
             <a:r>
-              <a:rPr lang="es-ES" dirty="0" err="1" smtClean="0"/>
+              <a:rPr lang="es-ES" dirty="0" err="1"/>
               <a:t>ke</a:t>
             </a:r>
             <a:r>
-              <a:rPr lang="es-ES" dirty="0" smtClean="0"/>
+              <a:rPr lang="es-ES" dirty="0"/>
               <a:t> browser </a:t>
             </a:r>
             <a:r>
-              <a:rPr lang="es-ES" dirty="0" err="1" smtClean="0"/>
+              <a:rPr lang="es-ES" dirty="0" err="1"/>
               <a:t>lalu</a:t>
             </a:r>
             <a:r>
-              <a:rPr lang="es-ES" dirty="0" smtClean="0"/>
+              <a:rPr lang="es-ES" dirty="0"/>
               <a:t> </a:t>
             </a:r>
             <a:r>
-              <a:rPr lang="es-ES" dirty="0" err="1" smtClean="0"/>
+              <a:rPr lang="es-ES" dirty="0" err="1"/>
               <a:t>refresh</a:t>
             </a:r>
             <a:r>
-              <a:rPr lang="es-ES" dirty="0" smtClean="0"/>
+              <a:rPr lang="es-ES" dirty="0"/>
               <a:t> </a:t>
             </a:r>
             <a:r>
-              <a:rPr lang="es-ES" dirty="0" err="1" smtClean="0"/>
+              <a:rPr lang="es-ES" dirty="0" err="1"/>
               <a:t>halaman</a:t>
             </a:r>
             <a:r>
-              <a:rPr lang="es-ES" dirty="0" smtClean="0"/>
+              <a:rPr lang="es-ES" dirty="0"/>
               <a:t> </a:t>
             </a:r>
             <a:r>
-              <a:rPr lang="es-ES" dirty="0" err="1" smtClean="0"/>
+              <a:rPr lang="es-ES" dirty="0" err="1"/>
               <a:t>website</a:t>
             </a:r>
             <a:r>
-              <a:rPr lang="es-ES" dirty="0" smtClean="0"/>
+              <a:rPr lang="es-ES" dirty="0"/>
               <a:t>, </a:t>
             </a:r>
             <a:r>
-              <a:rPr lang="es-ES" dirty="0" err="1" smtClean="0"/>
+              <a:rPr lang="es-ES" dirty="0" err="1"/>
               <a:t>maka</a:t>
             </a:r>
             <a:r>
-              <a:rPr lang="es-ES" dirty="0" smtClean="0"/>
+              <a:rPr lang="es-ES" dirty="0"/>
               <a:t> secara </a:t>
             </a:r>
             <a:r>
-              <a:rPr lang="es-ES" dirty="0" err="1" smtClean="0"/>
+              <a:rPr lang="es-ES" dirty="0" err="1"/>
               <a:t>otomatis</a:t>
             </a:r>
             <a:r>
-              <a:rPr lang="es-ES" dirty="0" smtClean="0"/>
+              <a:rPr lang="es-ES" dirty="0"/>
               <a:t> </a:t>
             </a:r>
             <a:r>
-              <a:rPr lang="es-ES" dirty="0" err="1" smtClean="0"/>
+              <a:rPr lang="es-ES" dirty="0" err="1"/>
               <a:t>tampilannya</a:t>
             </a:r>
             <a:r>
-              <a:rPr lang="es-ES" dirty="0" smtClean="0"/>
+              <a:rPr lang="es-ES" dirty="0"/>
               <a:t> </a:t>
             </a:r>
             <a:r>
-              <a:rPr lang="es-ES" dirty="0" err="1" smtClean="0"/>
+              <a:rPr lang="es-ES" dirty="0" err="1"/>
               <a:t>akan</a:t>
             </a:r>
             <a:r>
-              <a:rPr lang="es-ES" dirty="0" smtClean="0"/>
+              <a:rPr lang="es-ES" dirty="0"/>
               <a:t> </a:t>
             </a:r>
             <a:r>
-              <a:rPr lang="es-ES" dirty="0" err="1" smtClean="0"/>
+              <a:rPr lang="es-ES" dirty="0" err="1"/>
               <a:t>berubah</a:t>
             </a:r>
-            <a:endParaRPr lang="es-ES" dirty="0" smtClean="0"/>
+            <a:endParaRPr lang="es-ES" dirty="0"/>
           </a:p>
         </p:txBody>
       </p:sp>
@@ -13961,13 +13910,6 @@
   <p:clrMapOvr>
     <a:masterClrMapping/>
   </p:clrMapOvr>
-  <p:timing>
-    <p:tnLst>
-      <p:par>
-        <p:cTn id="1" dur="indefinite" restart="never" nodeType="tmRoot"/>
-      </p:par>
-    </p:tnLst>
-  </p:timing>
 </p:sld>
 </file>
 
@@ -14034,7 +13976,7 @@
               <a:t>Thank </a:t>
             </a:r>
             <a:r>
-              <a:rPr lang="en-US" b="0" dirty="0" smtClean="0"/>
+              <a:rPr lang="en-US" b="0" dirty="0"/>
               <a:t>You</a:t>
             </a:r>
             <a:endParaRPr lang="en-US" dirty="0"/>
@@ -14051,13 +13993,6 @@
   <p:clrMapOvr>
     <a:masterClrMapping/>
   </p:clrMapOvr>
-  <p:timing>
-    <p:tnLst>
-      <p:par>
-        <p:cTn id="1" dur="indefinite" restart="never" nodeType="tmRoot"/>
-      </p:par>
-    </p:tnLst>
-  </p:timing>
 </p:sld>
 </file>
 
@@ -14100,7 +14035,7 @@
           <a:lstStyle/>
           <a:p>
             <a:r>
-              <a:rPr lang="en-US" dirty="0" smtClean="0"/>
+              <a:rPr lang="en-US" dirty="0"/>
               <a:t>Create Project</a:t>
             </a:r>
             <a:endParaRPr lang="en-US" b="0" dirty="0"/>
@@ -14129,7 +14064,7 @@
           <a:lstStyle/>
           <a:p>
             <a:r>
-              <a:rPr lang="en-US" dirty="0" smtClean="0"/>
+              <a:rPr lang="en-US" dirty="0"/>
               <a:t>Static Web – Create Project</a:t>
             </a:r>
           </a:p>
@@ -14286,7 +14221,7 @@
           <a:lstStyle/>
           <a:p>
             <a:r>
-              <a:rPr lang="en-US" dirty="0" err="1" smtClean="0">
+              <a:rPr lang="en-US" dirty="0" err="1">
                 <a:solidFill>
                   <a:schemeClr val="tx1"/>
                 </a:solidFill>
@@ -14294,18 +14229,13 @@
               <a:t>php</a:t>
             </a:r>
             <a:r>
-              <a:rPr lang="en-US" dirty="0" smtClean="0">
+              <a:rPr lang="en-US" dirty="0">
                 <a:solidFill>
                   <a:schemeClr val="tx1"/>
                 </a:solidFill>
               </a:rPr>
               <a:t> artisan serve</a:t>
             </a:r>
-            <a:endParaRPr lang="en-US" dirty="0">
-              <a:solidFill>
-                <a:schemeClr val="tx1"/>
-              </a:solidFill>
-            </a:endParaRPr>
           </a:p>
         </p:txBody>
       </p:sp>
@@ -14515,27 +14445,27 @@
           </a:lstStyle>
           <a:p>
             <a:r>
-              <a:rPr lang="es-ES" dirty="0" smtClean="0"/>
+              <a:rPr lang="es-ES" dirty="0"/>
               <a:t>1. </a:t>
             </a:r>
             <a:r>
-              <a:rPr lang="es-ES" dirty="0" err="1" smtClean="0"/>
+              <a:rPr lang="es-ES" dirty="0" err="1"/>
               <a:t>Buat</a:t>
             </a:r>
             <a:r>
-              <a:rPr lang="es-ES" dirty="0" smtClean="0"/>
+              <a:rPr lang="es-ES" dirty="0"/>
               <a:t> </a:t>
             </a:r>
             <a:r>
-              <a:rPr lang="es-ES" dirty="0" err="1" smtClean="0"/>
+              <a:rPr lang="es-ES" dirty="0" err="1"/>
               <a:t>project</a:t>
             </a:r>
             <a:r>
-              <a:rPr lang="es-ES" dirty="0" smtClean="0"/>
+              <a:rPr lang="es-ES" dirty="0"/>
               <a:t> </a:t>
             </a:r>
             <a:r>
-              <a:rPr lang="es-ES" dirty="0" err="1" smtClean="0"/>
+              <a:rPr lang="es-ES" dirty="0" err="1"/>
               <a:t>laravel</a:t>
             </a:r>
             <a:endParaRPr lang="es-ES" dirty="0"/>
@@ -14584,7 +14514,7 @@
           <a:lstStyle/>
           <a:p>
             <a:r>
-              <a:rPr lang="en-US" dirty="0" err="1" smtClean="0">
+              <a:rPr lang="en-US" dirty="0" err="1">
                 <a:solidFill>
                   <a:schemeClr val="tx1"/>
                 </a:solidFill>
@@ -14592,7 +14522,7 @@
               <a:t>laravel</a:t>
             </a:r>
             <a:r>
-              <a:rPr lang="en-US" dirty="0" smtClean="0">
+              <a:rPr lang="en-US" dirty="0">
                 <a:solidFill>
                   <a:schemeClr val="tx1"/>
                 </a:solidFill>
@@ -14600,7 +14530,7 @@
               <a:t> new </a:t>
             </a:r>
             <a:r>
-              <a:rPr lang="en-US" dirty="0" err="1" smtClean="0">
+              <a:rPr lang="en-US" dirty="0" err="1">
                 <a:solidFill>
                   <a:schemeClr val="tx1"/>
                 </a:solidFill>
@@ -14821,26 +14751,25 @@
           </a:lstStyle>
           <a:p>
             <a:r>
-              <a:rPr lang="en-US" dirty="0" smtClean="0"/>
+              <a:rPr lang="en-US" dirty="0"/>
               <a:t>2. </a:t>
             </a:r>
             <a:r>
-              <a:rPr lang="en-US" dirty="0" err="1" smtClean="0"/>
+              <a:rPr lang="en-US" dirty="0" err="1"/>
               <a:t>Jalankan</a:t>
             </a:r>
             <a:r>
-              <a:rPr lang="en-US" dirty="0" smtClean="0"/>
+              <a:rPr lang="en-US" dirty="0"/>
               <a:t> web </a:t>
             </a:r>
             <a:r>
-              <a:rPr lang="en-US" dirty="0" err="1" smtClean="0"/>
+              <a:rPr lang="en-US" dirty="0" err="1"/>
               <a:t>nya</a:t>
             </a:r>
             <a:r>
-              <a:rPr lang="en-US" dirty="0" smtClean="0"/>
+              <a:rPr lang="en-US" dirty="0"/>
               <a:t> di local</a:t>
             </a:r>
-            <a:endParaRPr lang="en-US" dirty="0"/>
           </a:p>
         </p:txBody>
       </p:sp>
@@ -14901,13 +14830,6 @@
   <p:clrMapOvr>
     <a:masterClrMapping/>
   </p:clrMapOvr>
-  <p:timing>
-    <p:tnLst>
-      <p:par>
-        <p:cTn id="1" dur="indefinite" restart="never" nodeType="tmRoot"/>
-      </p:par>
-    </p:tnLst>
-  </p:timing>
 </p:sld>
 </file>
 
@@ -14950,7 +14872,7 @@
           <a:lstStyle/>
           <a:p>
             <a:r>
-              <a:rPr lang="en-US" dirty="0" smtClean="0"/>
+              <a:rPr lang="en-US" dirty="0"/>
               <a:t>Create Route</a:t>
             </a:r>
             <a:endParaRPr lang="en-US" b="0" dirty="0"/>
@@ -14980,13 +14902,8 @@
           <a:p>
             <a:r>
               <a:rPr lang="en-US" dirty="0"/>
-              <a:t>Static Web – Create </a:t>
-            </a:r>
-            <a:r>
-              <a:rPr lang="en-US" dirty="0" smtClean="0"/>
-              <a:t>Route</a:t>
-            </a:r>
-            <a:endParaRPr lang="en-US" dirty="0"/>
+              <a:t>Static Web – Create Route</a:t>
+            </a:r>
           </a:p>
         </p:txBody>
       </p:sp>
@@ -15305,47 +15222,47 @@
           </a:lstStyle>
           <a:p>
             <a:r>
-              <a:rPr lang="es-ES" dirty="0" smtClean="0"/>
+              <a:rPr lang="es-ES" dirty="0"/>
               <a:t>1. </a:t>
             </a:r>
             <a:r>
-              <a:rPr lang="es-ES" dirty="0" err="1" smtClean="0"/>
+              <a:rPr lang="es-ES" dirty="0" err="1"/>
               <a:t>Buka</a:t>
             </a:r>
             <a:r>
-              <a:rPr lang="es-ES" dirty="0" smtClean="0"/>
+              <a:rPr lang="es-ES" dirty="0"/>
               <a:t> file </a:t>
             </a:r>
             <a:r>
-              <a:rPr lang="es-ES" dirty="0" err="1" smtClean="0"/>
+              <a:rPr lang="es-ES" dirty="0" err="1"/>
               <a:t>web.php</a:t>
             </a:r>
             <a:r>
-              <a:rPr lang="es-ES" dirty="0" smtClean="0"/>
+              <a:rPr lang="es-ES" dirty="0"/>
               <a:t> yang </a:t>
             </a:r>
             <a:r>
-              <a:rPr lang="es-ES" dirty="0" err="1" smtClean="0"/>
+              <a:rPr lang="es-ES" dirty="0" err="1"/>
               <a:t>berada</a:t>
             </a:r>
             <a:r>
-              <a:rPr lang="es-ES" dirty="0" smtClean="0"/>
+              <a:rPr lang="es-ES" dirty="0"/>
               <a:t> </a:t>
             </a:r>
             <a:r>
-              <a:rPr lang="es-ES" dirty="0" err="1" smtClean="0"/>
+              <a:rPr lang="es-ES" dirty="0" err="1"/>
               <a:t>dalam</a:t>
             </a:r>
             <a:r>
-              <a:rPr lang="es-ES" dirty="0" smtClean="0"/>
+              <a:rPr lang="es-ES" dirty="0"/>
               <a:t> folder </a:t>
             </a:r>
             <a:r>
-              <a:rPr lang="es-ES" dirty="0" err="1" smtClean="0"/>
+              <a:rPr lang="es-ES" dirty="0" err="1"/>
               <a:t>route</a:t>
             </a:r>
             <a:r>
-              <a:rPr lang="es-ES" dirty="0" smtClean="0"/>
+              <a:rPr lang="es-ES" dirty="0"/>
               <a:t> </a:t>
             </a:r>
             <a:endParaRPr lang="es-ES" b="1" dirty="0"/>
@@ -15558,34 +15475,33 @@
           </a:lstStyle>
           <a:p>
             <a:r>
-              <a:rPr lang="en-US" dirty="0" smtClean="0"/>
+              <a:rPr lang="en-US" dirty="0"/>
               <a:t>2. </a:t>
             </a:r>
             <a:r>
-              <a:rPr lang="en-US" dirty="0" err="1" smtClean="0"/>
+              <a:rPr lang="en-US" dirty="0" err="1"/>
               <a:t>Ganti</a:t>
             </a:r>
             <a:r>
-              <a:rPr lang="en-US" dirty="0" smtClean="0"/>
+              <a:rPr lang="en-US" dirty="0"/>
               <a:t> </a:t>
             </a:r>
             <a:r>
-              <a:rPr lang="en-US" dirty="0" err="1" smtClean="0"/>
+              <a:rPr lang="en-US" dirty="0" err="1"/>
               <a:t>tulisan</a:t>
             </a:r>
             <a:r>
-              <a:rPr lang="en-US" dirty="0" smtClean="0"/>
+              <a:rPr lang="en-US" dirty="0"/>
               <a:t> welcome </a:t>
             </a:r>
             <a:r>
-              <a:rPr lang="en-US" dirty="0" err="1" smtClean="0"/>
+              <a:rPr lang="en-US" dirty="0" err="1"/>
               <a:t>menjadi</a:t>
             </a:r>
             <a:r>
-              <a:rPr lang="en-US" dirty="0" smtClean="0"/>
+              <a:rPr lang="en-US" dirty="0"/>
               <a:t> home</a:t>
             </a:r>
-            <a:endParaRPr lang="en-US" dirty="0"/>
           </a:p>
         </p:txBody>
       </p:sp>
@@ -15843,67 +15759,67 @@
           </a:lstStyle>
           <a:p>
             <a:r>
-              <a:rPr lang="en-US" dirty="0" smtClean="0"/>
+              <a:rPr lang="en-US" dirty="0"/>
               <a:t>3. </a:t>
             </a:r>
             <a:r>
-              <a:rPr lang="en-US" dirty="0" err="1" smtClean="0"/>
+              <a:rPr lang="en-US" dirty="0" err="1"/>
               <a:t>Buat</a:t>
             </a:r>
             <a:r>
-              <a:rPr lang="en-US" dirty="0" smtClean="0"/>
+              <a:rPr lang="en-US" dirty="0"/>
               <a:t> route </a:t>
             </a:r>
             <a:r>
-              <a:rPr lang="en-US" dirty="0" err="1" smtClean="0"/>
+              <a:rPr lang="en-US" dirty="0" err="1"/>
               <a:t>baru</a:t>
             </a:r>
             <a:r>
-              <a:rPr lang="en-US" dirty="0" smtClean="0"/>
+              <a:rPr lang="en-US" dirty="0"/>
               <a:t> </a:t>
             </a:r>
             <a:r>
-              <a:rPr lang="en-US" dirty="0" err="1" smtClean="0"/>
+              <a:rPr lang="en-US" dirty="0" err="1"/>
               <a:t>dengan</a:t>
             </a:r>
             <a:r>
-              <a:rPr lang="en-US" dirty="0" smtClean="0"/>
+              <a:rPr lang="en-US" dirty="0"/>
               <a:t> </a:t>
             </a:r>
             <a:r>
-              <a:rPr lang="en-US" dirty="0" err="1" smtClean="0"/>
+              <a:rPr lang="en-US" dirty="0" err="1"/>
               <a:t>mengembalikan</a:t>
             </a:r>
             <a:r>
-              <a:rPr lang="en-US" dirty="0" smtClean="0"/>
+              <a:rPr lang="en-US" dirty="0"/>
               <a:t> view </a:t>
             </a:r>
             <a:r>
-              <a:rPr lang="en-US" dirty="0" err="1" smtClean="0"/>
+              <a:rPr lang="en-US" dirty="0" err="1"/>
               <a:t>ke</a:t>
             </a:r>
             <a:r>
-              <a:rPr lang="en-US" dirty="0" smtClean="0"/>
+              <a:rPr lang="en-US" dirty="0"/>
               <a:t> file </a:t>
             </a:r>
             <a:r>
-              <a:rPr lang="en-US" dirty="0" err="1" smtClean="0"/>
+              <a:rPr lang="en-US" dirty="0" err="1"/>
               <a:t>about_us</a:t>
             </a:r>
             <a:r>
-              <a:rPr lang="en-US" dirty="0" smtClean="0"/>
+              <a:rPr lang="en-US" dirty="0"/>
               <a:t> </a:t>
             </a:r>
             <a:r>
-              <a:rPr lang="en-US" dirty="0" err="1" smtClean="0"/>
+              <a:rPr lang="en-US" dirty="0" err="1"/>
               <a:t>kemudian</a:t>
             </a:r>
             <a:r>
-              <a:rPr lang="en-US" dirty="0" smtClean="0"/>
+              <a:rPr lang="en-US" dirty="0"/>
               <a:t> </a:t>
             </a:r>
             <a:r>
-              <a:rPr lang="en-US" dirty="0" err="1" smtClean="0"/>
+              <a:rPr lang="en-US" dirty="0" err="1"/>
               <a:t>simpan</a:t>
             </a:r>
             <a:endParaRPr lang="en-US" dirty="0"/>
@@ -15944,13 +15860,6 @@
   <p:clrMapOvr>
     <a:masterClrMapping/>
   </p:clrMapOvr>
-  <p:timing>
-    <p:tnLst>
-      <p:par>
-        <p:cTn id="1" dur="indefinite" restart="never" nodeType="tmRoot"/>
-      </p:par>
-    </p:tnLst>
-  </p:timing>
 </p:sld>
 </file>
 
@@ -15993,7 +15902,7 @@
           <a:lstStyle/>
           <a:p>
             <a:r>
-              <a:rPr lang="en-US" dirty="0" smtClean="0"/>
+              <a:rPr lang="en-US" dirty="0"/>
               <a:t>Create Page</a:t>
             </a:r>
             <a:endParaRPr lang="en-US" b="0" dirty="0"/>
@@ -16023,13 +15932,8 @@
           <a:p>
             <a:r>
               <a:rPr lang="en-US" dirty="0"/>
-              <a:t>Static Web – Create </a:t>
-            </a:r>
-            <a:r>
-              <a:rPr lang="en-US" dirty="0" smtClean="0"/>
-              <a:t>Page</a:t>
-            </a:r>
-            <a:endParaRPr lang="en-US" dirty="0"/>
+              <a:t>Static Web – Create Page</a:t>
+            </a:r>
           </a:p>
         </p:txBody>
       </p:sp>
@@ -16348,69 +16252,69 @@
           </a:lstStyle>
           <a:p>
             <a:r>
-              <a:rPr lang="es-ES" dirty="0" smtClean="0"/>
+              <a:rPr lang="es-ES" dirty="0"/>
               <a:t>1. </a:t>
             </a:r>
             <a:r>
-              <a:rPr lang="es-ES" dirty="0" err="1" smtClean="0"/>
+              <a:rPr lang="es-ES" dirty="0" err="1"/>
               <a:t>Buat</a:t>
             </a:r>
             <a:r>
-              <a:rPr lang="es-ES" dirty="0" smtClean="0"/>
+              <a:rPr lang="es-ES" dirty="0"/>
               <a:t> file </a:t>
             </a:r>
             <a:r>
-              <a:rPr lang="es-ES" dirty="0" err="1" smtClean="0"/>
+              <a:rPr lang="es-ES" dirty="0" err="1"/>
               <a:t>baru</a:t>
             </a:r>
             <a:r>
-              <a:rPr lang="es-ES" dirty="0" smtClean="0"/>
+              <a:rPr lang="es-ES" dirty="0"/>
               <a:t> </a:t>
             </a:r>
             <a:r>
-              <a:rPr lang="es-ES" dirty="0" err="1" smtClean="0"/>
+              <a:rPr lang="es-ES" dirty="0" err="1"/>
               <a:t>dengan</a:t>
             </a:r>
             <a:r>
-              <a:rPr lang="es-ES" dirty="0" smtClean="0"/>
+              <a:rPr lang="es-ES" dirty="0"/>
               <a:t> </a:t>
             </a:r>
             <a:r>
-              <a:rPr lang="es-ES" dirty="0" err="1" smtClean="0"/>
+              <a:rPr lang="es-ES" dirty="0" err="1"/>
               <a:t>nama</a:t>
             </a:r>
             <a:r>
-              <a:rPr lang="es-ES" dirty="0" smtClean="0"/>
+              <a:rPr lang="es-ES" dirty="0"/>
               <a:t> </a:t>
             </a:r>
             <a:r>
-              <a:rPr lang="es-ES" b="1" dirty="0" err="1" smtClean="0">
+              <a:rPr lang="es-ES" b="1" dirty="0" err="1">
                 <a:hlinkClick r:id="rId3"/>
               </a:rPr>
               <a:t>home.blade.php</a:t>
             </a:r>
             <a:r>
-              <a:rPr lang="es-ES" dirty="0" smtClean="0"/>
+              <a:rPr lang="es-ES" dirty="0"/>
               <a:t> dan </a:t>
             </a:r>
             <a:r>
-              <a:rPr lang="es-ES" b="1" dirty="0" err="1" smtClean="0"/>
+              <a:rPr lang="es-ES" b="1" dirty="0" err="1"/>
               <a:t>about_us.blade.php</a:t>
             </a:r>
             <a:r>
-              <a:rPr lang="es-ES" dirty="0" smtClean="0"/>
+              <a:rPr lang="es-ES" dirty="0"/>
               <a:t> pada folder </a:t>
             </a:r>
             <a:r>
-              <a:rPr lang="es-ES" b="1" dirty="0" err="1" smtClean="0"/>
+              <a:rPr lang="es-ES" b="1" dirty="0" err="1"/>
               <a:t>resources</a:t>
             </a:r>
             <a:r>
-              <a:rPr lang="es-ES" b="1" dirty="0" smtClean="0"/>
+              <a:rPr lang="es-ES" b="1" dirty="0"/>
               <a:t>/</a:t>
             </a:r>
             <a:r>
-              <a:rPr lang="es-ES" b="1" dirty="0" err="1" smtClean="0"/>
+              <a:rPr lang="es-ES" b="1" dirty="0" err="1"/>
               <a:t>view</a:t>
             </a:r>
             <a:endParaRPr lang="es-ES" b="1" dirty="0"/>
@@ -16623,144 +16527,139 @@
           </a:lstStyle>
           <a:p>
             <a:r>
-              <a:rPr lang="en-US" dirty="0" smtClean="0"/>
-              <a:t>2. </a:t>
-            </a:r>
-            <a:r>
-              <a:rPr lang="en-US" dirty="0" smtClean="0"/>
-              <a:t>Edit file </a:t>
-            </a:r>
-            <a:r>
-              <a:rPr lang="en-US" b="1" dirty="0" err="1" smtClean="0">
+              <a:rPr lang="en-US" dirty="0"/>
+              <a:t>2. Edit file </a:t>
+            </a:r>
+            <a:r>
+              <a:rPr lang="en-US" b="1" dirty="0" err="1">
                 <a:hlinkClick r:id="rId3"/>
               </a:rPr>
               <a:t>home.blade.php</a:t>
             </a:r>
             <a:r>
-              <a:rPr lang="en-US" dirty="0" smtClean="0"/>
+              <a:rPr lang="en-US" dirty="0"/>
               <a:t> </a:t>
             </a:r>
             <a:r>
-              <a:rPr lang="en-US" dirty="0" err="1" smtClean="0"/>
+              <a:rPr lang="en-US" dirty="0" err="1"/>
               <a:t>dan</a:t>
             </a:r>
             <a:r>
-              <a:rPr lang="en-US" dirty="0" smtClean="0"/>
+              <a:rPr lang="en-US" dirty="0"/>
               <a:t> </a:t>
             </a:r>
             <a:r>
-              <a:rPr lang="en-US" dirty="0" err="1" smtClean="0"/>
+              <a:rPr lang="en-US" dirty="0" err="1"/>
               <a:t>halaman</a:t>
             </a:r>
             <a:r>
-              <a:rPr lang="en-US" dirty="0" smtClean="0"/>
+              <a:rPr lang="en-US" dirty="0"/>
               <a:t> </a:t>
             </a:r>
             <a:r>
-              <a:rPr lang="en-US" b="1" dirty="0" err="1" smtClean="0"/>
+              <a:rPr lang="en-US" b="1" dirty="0" err="1"/>
               <a:t>about_us.blade.php</a:t>
             </a:r>
             <a:r>
-              <a:rPr lang="en-US" dirty="0" smtClean="0"/>
+              <a:rPr lang="en-US" dirty="0"/>
               <a:t> </a:t>
             </a:r>
             <a:r>
-              <a:rPr lang="en-US" dirty="0" err="1" smtClean="0"/>
+              <a:rPr lang="en-US" dirty="0" err="1"/>
               <a:t>lalu</a:t>
             </a:r>
             <a:r>
-              <a:rPr lang="en-US" dirty="0" smtClean="0"/>
+              <a:rPr lang="en-US" dirty="0"/>
               <a:t> </a:t>
             </a:r>
             <a:r>
-              <a:rPr lang="en-US" dirty="0" err="1" smtClean="0"/>
+              <a:rPr lang="en-US" dirty="0" err="1"/>
               <a:t>tambahkan</a:t>
             </a:r>
             <a:r>
-              <a:rPr lang="en-US" dirty="0" smtClean="0"/>
+              <a:rPr lang="en-US" dirty="0"/>
               <a:t> </a:t>
             </a:r>
             <a:r>
-              <a:rPr lang="en-US" dirty="0" err="1" smtClean="0"/>
+              <a:rPr lang="en-US" dirty="0" err="1"/>
               <a:t>tulisan</a:t>
             </a:r>
             <a:r>
-              <a:rPr lang="en-US" dirty="0" smtClean="0"/>
+              <a:rPr lang="en-US" dirty="0"/>
               <a:t> HALAMAN UTAMA </a:t>
             </a:r>
             <a:r>
-              <a:rPr lang="en-US" dirty="0" err="1" smtClean="0"/>
+              <a:rPr lang="en-US" dirty="0" err="1"/>
               <a:t>dan</a:t>
             </a:r>
             <a:r>
-              <a:rPr lang="en-US" dirty="0" smtClean="0"/>
+              <a:rPr lang="en-US" dirty="0"/>
               <a:t> HALAMAN ABOUT </a:t>
             </a:r>
             <a:r>
-              <a:rPr lang="en-US" dirty="0" err="1" smtClean="0"/>
+              <a:rPr lang="en-US" dirty="0" err="1"/>
               <a:t>pada</a:t>
             </a:r>
             <a:r>
-              <a:rPr lang="en-US" dirty="0" smtClean="0"/>
+              <a:rPr lang="en-US" dirty="0"/>
               <a:t> </a:t>
             </a:r>
             <a:r>
-              <a:rPr lang="en-US" dirty="0" err="1" smtClean="0"/>
+              <a:rPr lang="en-US" dirty="0" err="1"/>
               <a:t>setiap</a:t>
             </a:r>
             <a:r>
-              <a:rPr lang="en-US" dirty="0" smtClean="0"/>
+              <a:rPr lang="en-US" dirty="0"/>
               <a:t> file </a:t>
             </a:r>
             <a:r>
-              <a:rPr lang="en-US" dirty="0" err="1" smtClean="0"/>
+              <a:rPr lang="en-US" dirty="0" err="1"/>
               <a:t>tersebut</a:t>
             </a:r>
             <a:r>
-              <a:rPr lang="en-US" dirty="0" smtClean="0"/>
+              <a:rPr lang="en-US" dirty="0"/>
               <a:t>, </a:t>
             </a:r>
             <a:r>
-              <a:rPr lang="en-US" dirty="0" err="1" smtClean="0"/>
+              <a:rPr lang="en-US" dirty="0" err="1"/>
               <a:t>lalu</a:t>
             </a:r>
             <a:r>
-              <a:rPr lang="en-US" dirty="0" smtClean="0"/>
+              <a:rPr lang="en-US" dirty="0"/>
               <a:t> </a:t>
             </a:r>
             <a:r>
-              <a:rPr lang="en-US" dirty="0" err="1" smtClean="0"/>
+              <a:rPr lang="en-US" dirty="0" err="1"/>
               <a:t>simpan</a:t>
             </a:r>
             <a:r>
-              <a:rPr lang="en-US" dirty="0" smtClean="0"/>
+              <a:rPr lang="en-US" dirty="0"/>
               <a:t> </a:t>
             </a:r>
             <a:r>
-              <a:rPr lang="en-US" dirty="0" err="1" smtClean="0"/>
+              <a:rPr lang="en-US" dirty="0" err="1"/>
               <a:t>dengan</a:t>
             </a:r>
             <a:r>
-              <a:rPr lang="en-US" dirty="0" smtClean="0"/>
+              <a:rPr lang="en-US" dirty="0"/>
               <a:t> </a:t>
             </a:r>
             <a:r>
-              <a:rPr lang="en-US" dirty="0" err="1" smtClean="0"/>
+              <a:rPr lang="en-US" dirty="0" err="1"/>
               <a:t>menekan</a:t>
             </a:r>
             <a:r>
-              <a:rPr lang="en-US" dirty="0" smtClean="0"/>
+              <a:rPr lang="en-US" dirty="0"/>
               <a:t> </a:t>
             </a:r>
             <a:r>
-              <a:rPr lang="en-US" dirty="0" err="1" smtClean="0"/>
+              <a:rPr lang="en-US" dirty="0" err="1"/>
               <a:t>tombol</a:t>
             </a:r>
             <a:r>
-              <a:rPr lang="en-US" dirty="0" smtClean="0"/>
+              <a:rPr lang="en-US" dirty="0"/>
               <a:t> CTRL+S</a:t>
             </a:r>
-            <a:endParaRPr lang="en-US" dirty="0"/>
           </a:p>
         </p:txBody>
       </p:sp>
@@ -16846,13 +16745,6 @@
   <p:clrMapOvr>
     <a:masterClrMapping/>
   </p:clrMapOvr>
-  <p:timing>
-    <p:tnLst>
-      <p:par>
-        <p:cTn id="1" dur="indefinite" restart="never" nodeType="tmRoot"/>
-      </p:par>
-    </p:tnLst>
-  </p:timing>
 </p:sld>
 </file>
 
@@ -16895,7 +16787,7 @@
           <a:lstStyle/>
           <a:p>
             <a:r>
-              <a:rPr lang="en-US" dirty="0" smtClean="0"/>
+              <a:rPr lang="en-US" dirty="0"/>
               <a:t>Create Page</a:t>
             </a:r>
             <a:endParaRPr lang="en-US" b="0" dirty="0"/>
@@ -16927,7 +16819,6 @@
               <a:rPr lang="en-US" dirty="0"/>
               <a:t>Static Web – Create Page</a:t>
             </a:r>
-            <a:endParaRPr lang="en-US" dirty="0"/>
           </a:p>
         </p:txBody>
       </p:sp>
@@ -17247,114 +17138,110 @@
           <a:p>
             <a:r>
               <a:rPr lang="es-ES" dirty="0"/>
-              <a:t>3</a:t>
-            </a:r>
-            <a:r>
-              <a:rPr lang="es-ES" dirty="0" smtClean="0"/>
-              <a:t>. </a:t>
-            </a:r>
-            <a:r>
-              <a:rPr lang="es-ES" dirty="0" err="1" smtClean="0"/>
+              <a:t>3. </a:t>
+            </a:r>
+            <a:r>
+              <a:rPr lang="es-ES" dirty="0" err="1"/>
               <a:t>Kembali</a:t>
             </a:r>
             <a:r>
-              <a:rPr lang="es-ES" dirty="0" smtClean="0"/>
+              <a:rPr lang="es-ES" dirty="0"/>
               <a:t> </a:t>
             </a:r>
             <a:r>
-              <a:rPr lang="es-ES" dirty="0" err="1" smtClean="0"/>
+              <a:rPr lang="es-ES" dirty="0" err="1"/>
               <a:t>ke</a:t>
             </a:r>
             <a:r>
-              <a:rPr lang="es-ES" dirty="0" smtClean="0"/>
+              <a:rPr lang="es-ES" dirty="0"/>
               <a:t> browser dan </a:t>
             </a:r>
             <a:r>
-              <a:rPr lang="es-ES" dirty="0" err="1" smtClean="0"/>
+              <a:rPr lang="es-ES" dirty="0" err="1"/>
               <a:t>refresh</a:t>
             </a:r>
             <a:r>
-              <a:rPr lang="es-ES" dirty="0" smtClean="0"/>
+              <a:rPr lang="es-ES" dirty="0"/>
               <a:t> </a:t>
             </a:r>
             <a:r>
-              <a:rPr lang="es-ES" dirty="0" err="1" smtClean="0"/>
+              <a:rPr lang="es-ES" dirty="0" err="1"/>
               <a:t>halaman</a:t>
             </a:r>
             <a:r>
-              <a:rPr lang="es-ES" dirty="0" smtClean="0"/>
+              <a:rPr lang="es-ES" dirty="0"/>
               <a:t> </a:t>
             </a:r>
             <a:r>
-              <a:rPr lang="es-ES" dirty="0" err="1" smtClean="0"/>
+              <a:rPr lang="es-ES" dirty="0" err="1"/>
               <a:t>nya</a:t>
             </a:r>
             <a:r>
-              <a:rPr lang="es-ES" dirty="0" smtClean="0"/>
+              <a:rPr lang="es-ES" dirty="0"/>
               <a:t>, </a:t>
             </a:r>
             <a:r>
-              <a:rPr lang="es-ES" dirty="0" err="1" smtClean="0"/>
+              <a:rPr lang="es-ES" dirty="0" err="1"/>
               <a:t>maka</a:t>
             </a:r>
             <a:r>
-              <a:rPr lang="es-ES" dirty="0" smtClean="0"/>
+              <a:rPr lang="es-ES" dirty="0"/>
               <a:t> </a:t>
             </a:r>
             <a:r>
-              <a:rPr lang="es-ES" dirty="0" err="1" smtClean="0"/>
+              <a:rPr lang="es-ES" dirty="0" err="1"/>
               <a:t>otomatis</a:t>
             </a:r>
             <a:r>
-              <a:rPr lang="es-ES" dirty="0" smtClean="0"/>
+              <a:rPr lang="es-ES" dirty="0"/>
               <a:t> </a:t>
             </a:r>
             <a:r>
-              <a:rPr lang="es-ES" dirty="0" err="1" smtClean="0"/>
+              <a:rPr lang="es-ES" dirty="0" err="1"/>
               <a:t>halaman</a:t>
             </a:r>
             <a:r>
-              <a:rPr lang="es-ES" dirty="0" smtClean="0"/>
+              <a:rPr lang="es-ES" dirty="0"/>
               <a:t> </a:t>
             </a:r>
             <a:r>
-              <a:rPr lang="es-ES" dirty="0" err="1" smtClean="0"/>
+              <a:rPr lang="es-ES" dirty="0" err="1"/>
               <a:t>welcome</a:t>
             </a:r>
             <a:r>
-              <a:rPr lang="es-ES" dirty="0" smtClean="0"/>
+              <a:rPr lang="es-ES" dirty="0"/>
               <a:t> </a:t>
             </a:r>
             <a:r>
-              <a:rPr lang="es-ES" dirty="0" err="1" smtClean="0"/>
+              <a:rPr lang="es-ES" dirty="0" err="1"/>
               <a:t>tadi</a:t>
             </a:r>
             <a:r>
-              <a:rPr lang="es-ES" dirty="0" smtClean="0"/>
+              <a:rPr lang="es-ES" dirty="0"/>
               <a:t> </a:t>
             </a:r>
             <a:r>
-              <a:rPr lang="es-ES" dirty="0" err="1" smtClean="0"/>
+              <a:rPr lang="es-ES" dirty="0" err="1"/>
               <a:t>berubah</a:t>
             </a:r>
             <a:r>
-              <a:rPr lang="es-ES" dirty="0" smtClean="0"/>
+              <a:rPr lang="es-ES" dirty="0"/>
               <a:t> </a:t>
             </a:r>
             <a:r>
-              <a:rPr lang="es-ES" dirty="0" err="1" smtClean="0"/>
+              <a:rPr lang="es-ES" dirty="0" err="1"/>
               <a:t>menjadi</a:t>
             </a:r>
             <a:r>
-              <a:rPr lang="es-ES" dirty="0" smtClean="0"/>
+              <a:rPr lang="es-ES" dirty="0"/>
               <a:t> </a:t>
             </a:r>
             <a:r>
-              <a:rPr lang="es-ES" dirty="0" err="1" smtClean="0"/>
+              <a:rPr lang="es-ES" dirty="0" err="1"/>
               <a:t>halaman</a:t>
             </a:r>
             <a:r>
-              <a:rPr lang="es-ES" dirty="0" smtClean="0"/>
+              <a:rPr lang="es-ES" dirty="0"/>
               <a:t> home</a:t>
             </a:r>
             <a:endParaRPr lang="es-ES" b="1" dirty="0"/>
@@ -17567,80 +17454,75 @@
           </a:lstStyle>
           <a:p>
             <a:r>
-              <a:rPr lang="en-US" dirty="0" smtClean="0"/>
+              <a:rPr lang="en-US" dirty="0"/>
               <a:t>4. Edit file </a:t>
             </a:r>
             <a:r>
-              <a:rPr lang="en-US" dirty="0" err="1" smtClean="0">
+              <a:rPr lang="en-US" dirty="0" err="1">
                 <a:hlinkClick r:id="rId3"/>
               </a:rPr>
               <a:t>home.blade.php</a:t>
             </a:r>
             <a:r>
-              <a:rPr lang="en-US" dirty="0" smtClean="0"/>
-              <a:t> </a:t>
-            </a:r>
-            <a:r>
-              <a:rPr lang="en-US" dirty="0" err="1" smtClean="0"/>
-              <a:t>tadi</a:t>
-            </a:r>
-            <a:r>
-              <a:rPr lang="en-US" dirty="0" smtClean="0"/>
-              <a:t> </a:t>
-            </a:r>
-            <a:r>
-              <a:rPr lang="en-US" dirty="0" err="1" smtClean="0"/>
-              <a:t>kemudian</a:t>
-            </a:r>
-            <a:r>
-              <a:rPr lang="en-US" dirty="0" smtClean="0"/>
-              <a:t> </a:t>
-            </a:r>
-            <a:r>
-              <a:rPr lang="en-US" dirty="0" err="1" smtClean="0"/>
-              <a:t>tambahkan</a:t>
-            </a:r>
-            <a:r>
-              <a:rPr lang="en-US" dirty="0" smtClean="0"/>
-              <a:t> tag html </a:t>
-            </a:r>
-            <a:r>
-              <a:rPr lang="en-US" dirty="0" err="1" smtClean="0"/>
-              <a:t>seperti</a:t>
-            </a:r>
-            <a:r>
-              <a:rPr lang="en-US" dirty="0" smtClean="0"/>
-              <a:t> </a:t>
-            </a:r>
-            <a:r>
-              <a:rPr lang="en-US" dirty="0" err="1" smtClean="0"/>
-              <a:t>contoh</a:t>
-            </a:r>
-            <a:r>
               <a:rPr lang="en-US" dirty="0"/>
               <a:t> </a:t>
             </a:r>
             <a:r>
-              <a:rPr lang="en-US" dirty="0" smtClean="0"/>
-              <a:t>di </a:t>
-            </a:r>
-            <a:r>
-              <a:rPr lang="en-US" dirty="0" err="1" smtClean="0"/>
+              <a:rPr lang="en-US" dirty="0" err="1"/>
+              <a:t>tadi</a:t>
+            </a:r>
+            <a:r>
+              <a:rPr lang="en-US" dirty="0"/>
+              <a:t> </a:t>
+            </a:r>
+            <a:r>
+              <a:rPr lang="en-US" dirty="0" err="1"/>
+              <a:t>kemudian</a:t>
+            </a:r>
+            <a:r>
+              <a:rPr lang="en-US" dirty="0"/>
+              <a:t> </a:t>
+            </a:r>
+            <a:r>
+              <a:rPr lang="en-US" dirty="0" err="1"/>
+              <a:t>tambahkan</a:t>
+            </a:r>
+            <a:r>
+              <a:rPr lang="en-US" dirty="0"/>
+              <a:t> tag html </a:t>
+            </a:r>
+            <a:r>
+              <a:rPr lang="en-US" dirty="0" err="1"/>
+              <a:t>seperti</a:t>
+            </a:r>
+            <a:r>
+              <a:rPr lang="en-US" dirty="0"/>
+              <a:t> </a:t>
+            </a:r>
+            <a:r>
+              <a:rPr lang="en-US" dirty="0" err="1"/>
+              <a:t>contoh</a:t>
+            </a:r>
+            <a:r>
+              <a:rPr lang="en-US" dirty="0"/>
+              <a:t> di </a:t>
+            </a:r>
+            <a:r>
+              <a:rPr lang="en-US" dirty="0" err="1"/>
               <a:t>bawah</a:t>
             </a:r>
             <a:r>
-              <a:rPr lang="en-US" dirty="0" smtClean="0"/>
+              <a:rPr lang="en-US" dirty="0"/>
               <a:t> </a:t>
             </a:r>
             <a:r>
-              <a:rPr lang="en-US" dirty="0" err="1" smtClean="0"/>
+              <a:rPr lang="en-US" dirty="0" err="1"/>
               <a:t>ini</a:t>
             </a:r>
             <a:r>
-              <a:rPr lang="en-US" dirty="0" smtClean="0"/>
+              <a:rPr lang="en-US" dirty="0"/>
               <a:t>.</a:t>
             </a:r>
-            <a:endParaRPr lang="en-US" dirty="0"/>
           </a:p>
         </p:txBody>
       </p:sp>
@@ -17786,13 +17668,6 @@
   <p:clrMapOvr>
     <a:masterClrMapping/>
   </p:clrMapOvr>
-  <p:timing>
-    <p:tnLst>
-      <p:par>
-        <p:cTn id="1" dur="indefinite" restart="never" nodeType="tmRoot"/>
-      </p:par>
-    </p:tnLst>
-  </p:timing>
 </p:sld>
 </file>
 
@@ -17835,7 +17710,7 @@
           <a:lstStyle/>
           <a:p>
             <a:r>
-              <a:rPr lang="en-US" dirty="0" smtClean="0"/>
+              <a:rPr lang="en-US" dirty="0"/>
               <a:t>Create Page</a:t>
             </a:r>
             <a:endParaRPr lang="en-US" b="0" dirty="0"/>
@@ -17867,7 +17742,6 @@
               <a:rPr lang="en-US" dirty="0"/>
               <a:t>Static Web – Create Page</a:t>
             </a:r>
-            <a:endParaRPr lang="en-US" dirty="0"/>
           </a:p>
         </p:txBody>
       </p:sp>
@@ -18187,94 +18061,90 @@
           <a:p>
             <a:r>
               <a:rPr lang="es-ES" dirty="0"/>
-              <a:t>5</a:t>
-            </a:r>
-            <a:r>
-              <a:rPr lang="es-ES" dirty="0" smtClean="0"/>
-              <a:t>. </a:t>
-            </a:r>
-            <a:r>
-              <a:rPr lang="es-ES" dirty="0" err="1" smtClean="0"/>
+              <a:t>5. </a:t>
+            </a:r>
+            <a:r>
+              <a:rPr lang="es-ES" dirty="0" err="1"/>
               <a:t>Kembali</a:t>
             </a:r>
             <a:r>
-              <a:rPr lang="es-ES" dirty="0" smtClean="0"/>
+              <a:rPr lang="es-ES" dirty="0"/>
               <a:t> </a:t>
             </a:r>
             <a:r>
-              <a:rPr lang="es-ES" dirty="0" err="1" smtClean="0"/>
+              <a:rPr lang="es-ES" dirty="0" err="1"/>
               <a:t>ke</a:t>
             </a:r>
             <a:r>
-              <a:rPr lang="es-ES" dirty="0" smtClean="0"/>
+              <a:rPr lang="es-ES" dirty="0"/>
               <a:t> browser dan </a:t>
             </a:r>
             <a:r>
-              <a:rPr lang="es-ES" dirty="0" err="1" smtClean="0"/>
+              <a:rPr lang="es-ES" dirty="0" err="1"/>
               <a:t>refresh</a:t>
             </a:r>
             <a:r>
-              <a:rPr lang="es-ES" dirty="0" smtClean="0"/>
+              <a:rPr lang="es-ES" dirty="0"/>
               <a:t> </a:t>
             </a:r>
             <a:r>
-              <a:rPr lang="es-ES" dirty="0" err="1" smtClean="0"/>
+              <a:rPr lang="es-ES" dirty="0" err="1"/>
               <a:t>halaman</a:t>
             </a:r>
             <a:r>
-              <a:rPr lang="es-ES" dirty="0" smtClean="0"/>
+              <a:rPr lang="es-ES" dirty="0"/>
               <a:t> </a:t>
             </a:r>
             <a:r>
-              <a:rPr lang="es-ES" dirty="0" err="1" smtClean="0"/>
+              <a:rPr lang="es-ES" dirty="0" err="1"/>
               <a:t>nya</a:t>
             </a:r>
             <a:r>
-              <a:rPr lang="es-ES" dirty="0" smtClean="0"/>
+              <a:rPr lang="es-ES" dirty="0"/>
               <a:t>, </a:t>
             </a:r>
             <a:r>
-              <a:rPr lang="es-ES" dirty="0" err="1" smtClean="0"/>
+              <a:rPr lang="es-ES" dirty="0" err="1"/>
               <a:t>maka</a:t>
             </a:r>
             <a:r>
-              <a:rPr lang="es-ES" dirty="0" smtClean="0"/>
+              <a:rPr lang="es-ES" dirty="0"/>
               <a:t> </a:t>
             </a:r>
             <a:r>
-              <a:rPr lang="es-ES" dirty="0" err="1" smtClean="0"/>
+              <a:rPr lang="es-ES" dirty="0" err="1"/>
               <a:t>otomatis</a:t>
             </a:r>
             <a:r>
-              <a:rPr lang="es-ES" dirty="0" smtClean="0"/>
+              <a:rPr lang="es-ES" dirty="0"/>
               <a:t> </a:t>
             </a:r>
             <a:r>
-              <a:rPr lang="es-ES" dirty="0" err="1" smtClean="0"/>
+              <a:rPr lang="es-ES" dirty="0" err="1"/>
               <a:t>halaman</a:t>
             </a:r>
             <a:r>
-              <a:rPr lang="es-ES" dirty="0" smtClean="0"/>
+              <a:rPr lang="es-ES" dirty="0"/>
               <a:t> </a:t>
             </a:r>
             <a:r>
-              <a:rPr lang="es-ES" dirty="0" err="1" smtClean="0"/>
+              <a:rPr lang="es-ES" dirty="0" err="1"/>
               <a:t>tadi</a:t>
             </a:r>
             <a:r>
-              <a:rPr lang="es-ES" dirty="0" smtClean="0"/>
+              <a:rPr lang="es-ES" dirty="0"/>
               <a:t> </a:t>
             </a:r>
             <a:r>
-              <a:rPr lang="es-ES" dirty="0" err="1" smtClean="0"/>
+              <a:rPr lang="es-ES" dirty="0" err="1"/>
               <a:t>akan</a:t>
             </a:r>
             <a:r>
-              <a:rPr lang="es-ES" dirty="0" smtClean="0"/>
+              <a:rPr lang="es-ES" dirty="0"/>
               <a:t> </a:t>
             </a:r>
             <a:r>
-              <a:rPr lang="es-ES" dirty="0" err="1" smtClean="0"/>
+              <a:rPr lang="es-ES" dirty="0" err="1"/>
               <a:t>berubah</a:t>
             </a:r>
             <a:endParaRPr lang="es-ES" b="1" dirty="0"/>
@@ -18487,90 +18357,89 @@
           </a:lstStyle>
           <a:p>
             <a:r>
-              <a:rPr lang="en-US" dirty="0" smtClean="0"/>
+              <a:rPr lang="en-US" dirty="0"/>
               <a:t>6. </a:t>
             </a:r>
             <a:r>
-              <a:rPr lang="en-US" dirty="0" err="1" smtClean="0"/>
+              <a:rPr lang="en-US" dirty="0" err="1"/>
               <a:t>Klik</a:t>
             </a:r>
             <a:r>
-              <a:rPr lang="en-US" dirty="0" smtClean="0"/>
+              <a:rPr lang="en-US" dirty="0"/>
               <a:t> </a:t>
             </a:r>
             <a:r>
-              <a:rPr lang="en-US" dirty="0" err="1" smtClean="0"/>
+              <a:rPr lang="en-US" dirty="0" err="1"/>
               <a:t>tulisan</a:t>
             </a:r>
             <a:r>
-              <a:rPr lang="en-US" dirty="0" smtClean="0"/>
+              <a:rPr lang="en-US" dirty="0"/>
               <a:t> “KE HALAMAN ABOUT US” </a:t>
             </a:r>
             <a:r>
-              <a:rPr lang="en-US" dirty="0" err="1" smtClean="0"/>
+              <a:rPr lang="en-US" dirty="0" err="1"/>
               <a:t>maka</a:t>
             </a:r>
             <a:r>
-              <a:rPr lang="en-US" dirty="0" smtClean="0"/>
+              <a:rPr lang="en-US" dirty="0"/>
               <a:t> </a:t>
             </a:r>
             <a:r>
-              <a:rPr lang="en-US" dirty="0" err="1" smtClean="0"/>
+              <a:rPr lang="en-US" dirty="0" err="1"/>
               <a:t>secara</a:t>
             </a:r>
             <a:r>
-              <a:rPr lang="en-US" dirty="0" smtClean="0"/>
+              <a:rPr lang="en-US" dirty="0"/>
               <a:t> </a:t>
             </a:r>
             <a:r>
-              <a:rPr lang="en-US" dirty="0" err="1" smtClean="0"/>
+              <a:rPr lang="en-US" dirty="0" err="1"/>
               <a:t>otomatis</a:t>
             </a:r>
             <a:r>
-              <a:rPr lang="en-US" dirty="0" smtClean="0"/>
+              <a:rPr lang="en-US" dirty="0"/>
               <a:t> </a:t>
             </a:r>
             <a:r>
-              <a:rPr lang="en-US" dirty="0" err="1" smtClean="0"/>
+              <a:rPr lang="en-US" dirty="0" err="1"/>
               <a:t>halaman</a:t>
             </a:r>
             <a:r>
-              <a:rPr lang="en-US" dirty="0" smtClean="0"/>
+              <a:rPr lang="en-US" dirty="0"/>
               <a:t> </a:t>
             </a:r>
             <a:r>
-              <a:rPr lang="en-US" dirty="0" err="1" smtClean="0"/>
+              <a:rPr lang="en-US" dirty="0" err="1"/>
               <a:t>akan</a:t>
             </a:r>
             <a:r>
-              <a:rPr lang="en-US" dirty="0" smtClean="0"/>
+              <a:rPr lang="en-US" dirty="0"/>
               <a:t> </a:t>
             </a:r>
             <a:r>
-              <a:rPr lang="en-US" dirty="0" err="1" smtClean="0"/>
+              <a:rPr lang="en-US" dirty="0" err="1"/>
               <a:t>berubah</a:t>
             </a:r>
             <a:r>
-              <a:rPr lang="en-US" dirty="0" smtClean="0"/>
+              <a:rPr lang="en-US" dirty="0"/>
               <a:t> </a:t>
             </a:r>
             <a:r>
-              <a:rPr lang="en-US" dirty="0" err="1" smtClean="0"/>
+              <a:rPr lang="en-US" dirty="0" err="1"/>
               <a:t>ke</a:t>
             </a:r>
             <a:r>
-              <a:rPr lang="en-US" dirty="0" smtClean="0"/>
+              <a:rPr lang="en-US" dirty="0"/>
               <a:t> </a:t>
             </a:r>
             <a:r>
-              <a:rPr lang="en-US" dirty="0" err="1" smtClean="0"/>
+              <a:rPr lang="en-US" dirty="0" err="1"/>
               <a:t>halaman</a:t>
             </a:r>
             <a:r>
-              <a:rPr lang="en-US" dirty="0" smtClean="0"/>
+              <a:rPr lang="en-US" dirty="0"/>
               <a:t> about</a:t>
             </a:r>
-            <a:endParaRPr lang="en-US" dirty="0"/>
           </a:p>
         </p:txBody>
       </p:sp>
@@ -18632,13 +18501,6 @@
   <p:clrMapOvr>
     <a:masterClrMapping/>
   </p:clrMapOvr>
-  <p:timing>
-    <p:tnLst>
-      <p:par>
-        <p:cTn id="1" dur="indefinite" restart="never" nodeType="tmRoot"/>
-      </p:par>
-    </p:tnLst>
-  </p:timing>
 </p:sld>
 </file>
 
@@ -18683,7 +18545,7 @@
           <a:lstStyle/>
           <a:p>
             <a:r>
-              <a:rPr lang="en-US" dirty="0" smtClean="0"/>
+              <a:rPr lang="en-US" dirty="0"/>
               <a:t>Styling</a:t>
             </a:r>
             <a:endParaRPr lang="en-US" b="0" dirty="0"/>
@@ -18713,13 +18575,8 @@
           <a:p>
             <a:r>
               <a:rPr lang="en-US" dirty="0"/>
-              <a:t>Static Web – </a:t>
-            </a:r>
-            <a:r>
-              <a:rPr lang="en-US" dirty="0" smtClean="0"/>
-              <a:t>Styling</a:t>
-            </a:r>
-            <a:endParaRPr lang="en-US" dirty="0"/>
+              <a:t>Static Web – Styling</a:t>
+            </a:r>
           </a:p>
         </p:txBody>
       </p:sp>
@@ -19038,142 +18895,142 @@
           </a:lstStyle>
           <a:p>
             <a:r>
-              <a:rPr lang="es-ES" dirty="0" smtClean="0"/>
+              <a:rPr lang="es-ES" dirty="0"/>
               <a:t>1. </a:t>
             </a:r>
             <a:r>
-              <a:rPr lang="es-ES" dirty="0" err="1" smtClean="0"/>
+              <a:rPr lang="es-ES" dirty="0" err="1"/>
               <a:t>Buat</a:t>
             </a:r>
             <a:r>
-              <a:rPr lang="es-ES" dirty="0" smtClean="0"/>
+              <a:rPr lang="es-ES" dirty="0"/>
               <a:t> folder </a:t>
             </a:r>
             <a:r>
-              <a:rPr lang="es-ES" dirty="0" err="1" smtClean="0"/>
+              <a:rPr lang="es-ES" dirty="0" err="1"/>
               <a:t>baru</a:t>
             </a:r>
             <a:r>
-              <a:rPr lang="es-ES" dirty="0" smtClean="0"/>
+              <a:rPr lang="es-ES" dirty="0"/>
               <a:t> di </a:t>
             </a:r>
             <a:r>
-              <a:rPr lang="es-ES" dirty="0" err="1" smtClean="0"/>
+              <a:rPr lang="es-ES" dirty="0" err="1"/>
               <a:t>dalam</a:t>
             </a:r>
             <a:r>
-              <a:rPr lang="es-ES" dirty="0" smtClean="0"/>
+              <a:rPr lang="es-ES" dirty="0"/>
               <a:t> folder </a:t>
             </a:r>
             <a:r>
-              <a:rPr lang="es-ES" dirty="0" err="1" smtClean="0"/>
+              <a:rPr lang="es-ES" dirty="0" err="1"/>
               <a:t>public</a:t>
             </a:r>
             <a:r>
-              <a:rPr lang="es-ES" dirty="0" smtClean="0"/>
+              <a:rPr lang="es-ES" dirty="0"/>
               <a:t> </a:t>
             </a:r>
             <a:r>
-              <a:rPr lang="es-ES" dirty="0" err="1" smtClean="0"/>
+              <a:rPr lang="es-ES" dirty="0" err="1"/>
               <a:t>dengan</a:t>
             </a:r>
             <a:r>
-              <a:rPr lang="es-ES" dirty="0" smtClean="0"/>
+              <a:rPr lang="es-ES" dirty="0"/>
               <a:t> </a:t>
             </a:r>
             <a:r>
-              <a:rPr lang="es-ES" dirty="0" err="1" smtClean="0"/>
+              <a:rPr lang="es-ES" dirty="0" err="1"/>
               <a:t>nama</a:t>
             </a:r>
             <a:r>
-              <a:rPr lang="es-ES" dirty="0" smtClean="0"/>
+              <a:rPr lang="es-ES" dirty="0"/>
               <a:t> </a:t>
             </a:r>
             <a:r>
-              <a:rPr lang="es-ES" b="1" dirty="0" err="1" smtClean="0"/>
+              <a:rPr lang="es-ES" b="1" dirty="0" err="1"/>
               <a:t>style</a:t>
             </a:r>
-            <a:endParaRPr lang="es-ES" b="1" dirty="0" smtClean="0"/>
-          </a:p>
-          <a:p>
-            <a:r>
-              <a:rPr lang="es-ES" dirty="0" smtClean="0"/>
+            <a:endParaRPr lang="es-ES" b="1" dirty="0"/>
+          </a:p>
+          <a:p>
+            <a:r>
+              <a:rPr lang="es-ES" dirty="0"/>
               <a:t>2. </a:t>
             </a:r>
             <a:r>
-              <a:rPr lang="es-ES" dirty="0" err="1" smtClean="0"/>
+              <a:rPr lang="es-ES" dirty="0" err="1"/>
               <a:t>Buat</a:t>
             </a:r>
             <a:r>
-              <a:rPr lang="es-ES" dirty="0" smtClean="0"/>
+              <a:rPr lang="es-ES" dirty="0"/>
               <a:t> </a:t>
             </a:r>
             <a:r>
-              <a:rPr lang="es-ES" dirty="0" err="1" smtClean="0"/>
+              <a:rPr lang="es-ES" dirty="0" err="1"/>
               <a:t>dua</a:t>
             </a:r>
             <a:r>
-              <a:rPr lang="es-ES" dirty="0" smtClean="0"/>
+              <a:rPr lang="es-ES" dirty="0"/>
               <a:t> </a:t>
             </a:r>
             <a:r>
-              <a:rPr lang="es-ES" dirty="0" err="1" smtClean="0"/>
+              <a:rPr lang="es-ES" dirty="0" err="1"/>
               <a:t>buah</a:t>
             </a:r>
             <a:r>
-              <a:rPr lang="es-ES" dirty="0" smtClean="0"/>
+              <a:rPr lang="es-ES" dirty="0"/>
               <a:t> file </a:t>
             </a:r>
             <a:r>
-              <a:rPr lang="es-ES" dirty="0" err="1" smtClean="0"/>
+              <a:rPr lang="es-ES" dirty="0" err="1"/>
               <a:t>baru</a:t>
             </a:r>
             <a:r>
-              <a:rPr lang="es-ES" dirty="0" smtClean="0"/>
+              <a:rPr lang="es-ES" dirty="0"/>
               <a:t> di </a:t>
             </a:r>
             <a:r>
-              <a:rPr lang="es-ES" dirty="0" err="1" smtClean="0"/>
+              <a:rPr lang="es-ES" dirty="0" err="1"/>
               <a:t>dalam</a:t>
             </a:r>
             <a:r>
-              <a:rPr lang="es-ES" dirty="0" smtClean="0"/>
+              <a:rPr lang="es-ES" dirty="0"/>
               <a:t> folder </a:t>
             </a:r>
             <a:r>
-              <a:rPr lang="es-ES" b="1" dirty="0" err="1" smtClean="0"/>
+              <a:rPr lang="es-ES" b="1" dirty="0" err="1"/>
               <a:t>style</a:t>
             </a:r>
             <a:r>
-              <a:rPr lang="es-ES" dirty="0" smtClean="0"/>
+              <a:rPr lang="es-ES" dirty="0"/>
               <a:t> </a:t>
             </a:r>
             <a:r>
-              <a:rPr lang="es-ES" dirty="0" err="1" smtClean="0"/>
+              <a:rPr lang="es-ES" dirty="0" err="1"/>
               <a:t>dengan</a:t>
             </a:r>
             <a:r>
-              <a:rPr lang="es-ES" dirty="0" smtClean="0"/>
+              <a:rPr lang="es-ES" dirty="0"/>
               <a:t> </a:t>
             </a:r>
             <a:r>
-              <a:rPr lang="es-ES" dirty="0" err="1" smtClean="0"/>
+              <a:rPr lang="es-ES" dirty="0" err="1"/>
               <a:t>nama</a:t>
             </a:r>
             <a:r>
-              <a:rPr lang="es-ES" dirty="0" smtClean="0"/>
+              <a:rPr lang="es-ES" dirty="0"/>
               <a:t> </a:t>
             </a:r>
             <a:r>
-              <a:rPr lang="es-ES" b="1" dirty="0" smtClean="0"/>
+              <a:rPr lang="es-ES" b="1" dirty="0"/>
               <a:t>custom.css</a:t>
             </a:r>
             <a:r>
-              <a:rPr lang="es-ES" dirty="0" smtClean="0"/>
+              <a:rPr lang="es-ES" dirty="0"/>
               <a:t> dan </a:t>
             </a:r>
             <a:r>
-              <a:rPr lang="es-ES" b="1" dirty="0" smtClean="0"/>
+              <a:rPr lang="es-ES" b="1" dirty="0"/>
               <a:t>custom.js</a:t>
             </a:r>
           </a:p>
@@ -19409,38 +19266,38 @@
           </a:lstStyle>
           <a:p>
             <a:r>
-              <a:rPr lang="es-ES" dirty="0" smtClean="0"/>
+              <a:rPr lang="es-ES" dirty="0"/>
               <a:t>3. </a:t>
             </a:r>
             <a:r>
-              <a:rPr lang="es-ES" dirty="0" err="1" smtClean="0"/>
+              <a:rPr lang="es-ES" dirty="0" err="1"/>
               <a:t>Edit</a:t>
             </a:r>
             <a:r>
-              <a:rPr lang="es-ES" dirty="0" smtClean="0"/>
+              <a:rPr lang="es-ES" dirty="0"/>
               <a:t> custom.css dan </a:t>
             </a:r>
             <a:r>
-              <a:rPr lang="es-ES" dirty="0" err="1" smtClean="0"/>
+              <a:rPr lang="es-ES" dirty="0" err="1"/>
               <a:t>tambahkan</a:t>
             </a:r>
             <a:r>
-              <a:rPr lang="es-ES" dirty="0" smtClean="0"/>
+              <a:rPr lang="es-ES" dirty="0"/>
               <a:t> </a:t>
             </a:r>
             <a:r>
-              <a:rPr lang="es-ES" dirty="0" err="1" smtClean="0"/>
+              <a:rPr lang="es-ES" dirty="0" err="1"/>
               <a:t>code</a:t>
             </a:r>
             <a:r>
-              <a:rPr lang="es-ES" dirty="0" smtClean="0"/>
+              <a:rPr lang="es-ES" dirty="0"/>
               <a:t> di </a:t>
             </a:r>
             <a:r>
-              <a:rPr lang="es-ES" dirty="0" err="1" smtClean="0"/>
+              <a:rPr lang="es-ES" dirty="0" err="1"/>
               <a:t>samping</a:t>
             </a:r>
-            <a:endParaRPr lang="es-ES" b="1" dirty="0" smtClean="0"/>
+            <a:endParaRPr lang="es-ES" b="1" dirty="0"/>
           </a:p>
         </p:txBody>
       </p:sp>
@@ -19452,7 +19309,7 @@
         </p:nvSpPr>
         <p:spPr>
           <a:xfrm>
-            <a:off x="6663079" y="3255213"/>
+            <a:off x="6795021" y="3225102"/>
             <a:ext cx="2363002" cy="1504243"/>
           </a:xfrm>
           <a:prstGeom prst="rect">
@@ -19491,21 +19348,8 @@
                   <a:schemeClr val="tx1"/>
                 </a:solidFill>
               </a:rPr>
-              <a:t>b</a:t>
-            </a:r>
-            <a:r>
-              <a:rPr lang="en-US" dirty="0" smtClean="0">
-                <a:solidFill>
-                  <a:schemeClr val="tx1"/>
-                </a:solidFill>
-              </a:rPr>
-              <a:t>ody {</a:t>
-            </a:r>
-            <a:endParaRPr lang="en-US" dirty="0">
-              <a:solidFill>
-                <a:schemeClr val="tx1"/>
-              </a:solidFill>
-            </a:endParaRPr>
+              <a:t>body {</a:t>
+            </a:r>
           </a:p>
           <a:p>
             <a:r>
@@ -19561,18 +19405,13 @@
           </a:p>
           <a:p>
             <a:r>
-              <a:rPr lang="en-US" dirty="0" smtClean="0">
+              <a:rPr lang="en-US" dirty="0">
                 <a:solidFill>
                   <a:schemeClr val="tx1"/>
                 </a:solidFill>
               </a:rPr>
               <a:t>}</a:t>
             </a:r>
-            <a:endParaRPr lang="en-US" dirty="0">
-              <a:solidFill>
-                <a:schemeClr val="tx1"/>
-              </a:solidFill>
-            </a:endParaRPr>
           </a:p>
         </p:txBody>
       </p:sp>
@@ -19806,49 +19645,45 @@
           <a:p>
             <a:r>
               <a:rPr lang="es-ES" dirty="0"/>
-              <a:t>4</a:t>
-            </a:r>
-            <a:r>
-              <a:rPr lang="es-ES" dirty="0" smtClean="0"/>
-              <a:t>. </a:t>
-            </a:r>
-            <a:r>
-              <a:rPr lang="es-ES" dirty="0" err="1" smtClean="0"/>
+              <a:t>4. </a:t>
+            </a:r>
+            <a:r>
+              <a:rPr lang="es-ES" dirty="0" err="1"/>
               <a:t>Edit</a:t>
             </a:r>
             <a:r>
-              <a:rPr lang="es-ES" dirty="0" smtClean="0"/>
+              <a:rPr lang="es-ES" dirty="0"/>
               <a:t> </a:t>
             </a:r>
             <a:r>
-              <a:rPr lang="es-ES" dirty="0" err="1" smtClean="0"/>
+              <a:rPr lang="es-ES" dirty="0" err="1"/>
               <a:t>custom.jsdan</a:t>
             </a:r>
             <a:r>
-              <a:rPr lang="es-ES" dirty="0" smtClean="0"/>
+              <a:rPr lang="es-ES" dirty="0"/>
               <a:t> </a:t>
             </a:r>
             <a:r>
-              <a:rPr lang="es-ES" dirty="0" err="1" smtClean="0"/>
+              <a:rPr lang="es-ES" dirty="0" err="1"/>
               <a:t>tambahkan</a:t>
             </a:r>
             <a:r>
-              <a:rPr lang="es-ES" dirty="0" smtClean="0"/>
+              <a:rPr lang="es-ES" dirty="0"/>
               <a:t> </a:t>
             </a:r>
             <a:r>
-              <a:rPr lang="es-ES" dirty="0" err="1" smtClean="0"/>
+              <a:rPr lang="es-ES" dirty="0" err="1"/>
               <a:t>code</a:t>
             </a:r>
             <a:r>
-              <a:rPr lang="es-ES" dirty="0" smtClean="0"/>
+              <a:rPr lang="es-ES" dirty="0"/>
               <a:t> di </a:t>
             </a:r>
             <a:r>
-              <a:rPr lang="es-ES" dirty="0" err="1" smtClean="0"/>
+              <a:rPr lang="es-ES" dirty="0" err="1"/>
               <a:t>samping</a:t>
             </a:r>
-            <a:endParaRPr lang="es-ES" b="1" dirty="0" smtClean="0"/>
+            <a:endParaRPr lang="es-ES" b="1" dirty="0"/>
           </a:p>
         </p:txBody>
       </p:sp>
@@ -19938,13 +19773,6 @@
   <p:clrMapOvr>
     <a:masterClrMapping/>
   </p:clrMapOvr>
-  <p:timing>
-    <p:tnLst>
-      <p:par>
-        <p:cTn id="1" dur="indefinite" restart="never" nodeType="tmRoot"/>
-      </p:par>
-    </p:tnLst>
-  </p:timing>
 </p:sld>
 </file>
 
@@ -19989,7 +19817,7 @@
           <a:lstStyle/>
           <a:p>
             <a:r>
-              <a:rPr lang="en-US" dirty="0" smtClean="0"/>
+              <a:rPr lang="en-US" dirty="0"/>
               <a:t>Styling</a:t>
             </a:r>
             <a:endParaRPr lang="en-US" b="0" dirty="0"/>
@@ -20019,13 +19847,8 @@
           <a:p>
             <a:r>
               <a:rPr lang="en-US" dirty="0"/>
-              <a:t>Static Web – </a:t>
-            </a:r>
-            <a:r>
-              <a:rPr lang="en-US" dirty="0" smtClean="0"/>
-              <a:t>Styling</a:t>
-            </a:r>
-            <a:endParaRPr lang="en-US" dirty="0"/>
+              <a:t>Static Web – Styling</a:t>
+            </a:r>
           </a:p>
         </p:txBody>
       </p:sp>
@@ -20345,67 +20168,63 @@
           <a:p>
             <a:r>
               <a:rPr lang="es-ES" dirty="0"/>
-              <a:t>5</a:t>
-            </a:r>
-            <a:r>
-              <a:rPr lang="es-ES" dirty="0" smtClean="0"/>
-              <a:t>. </a:t>
-            </a:r>
-            <a:r>
-              <a:rPr lang="es-ES" dirty="0" err="1" smtClean="0"/>
+              <a:t>5. </a:t>
+            </a:r>
+            <a:r>
+              <a:rPr lang="es-ES" dirty="0" err="1"/>
               <a:t>Edit</a:t>
             </a:r>
             <a:r>
-              <a:rPr lang="es-ES" dirty="0" smtClean="0"/>
+              <a:rPr lang="es-ES" dirty="0"/>
               <a:t> file </a:t>
             </a:r>
             <a:r>
-              <a:rPr lang="es-ES" dirty="0" err="1" smtClean="0">
+              <a:rPr lang="es-ES" dirty="0" err="1">
                 <a:hlinkClick r:id="rId3"/>
               </a:rPr>
               <a:t>home.blade.php</a:t>
             </a:r>
             <a:r>
-              <a:rPr lang="es-ES" dirty="0" smtClean="0"/>
+              <a:rPr lang="es-ES" dirty="0"/>
               <a:t> </a:t>
             </a:r>
             <a:r>
-              <a:rPr lang="es-ES" dirty="0" err="1" smtClean="0"/>
+              <a:rPr lang="es-ES" dirty="0" err="1"/>
               <a:t>lalu</a:t>
             </a:r>
             <a:r>
-              <a:rPr lang="es-ES" dirty="0" smtClean="0"/>
+              <a:rPr lang="es-ES" dirty="0"/>
               <a:t> </a:t>
             </a:r>
             <a:r>
-              <a:rPr lang="es-ES" dirty="0" err="1" smtClean="0"/>
+              <a:rPr lang="es-ES" dirty="0" err="1"/>
               <a:t>masukan</a:t>
             </a:r>
             <a:r>
-              <a:rPr lang="es-ES" dirty="0" smtClean="0"/>
+              <a:rPr lang="es-ES" dirty="0"/>
               <a:t> </a:t>
             </a:r>
             <a:r>
-              <a:rPr lang="es-ES" dirty="0" err="1" smtClean="0"/>
+              <a:rPr lang="es-ES" dirty="0" err="1"/>
               <a:t>code</a:t>
             </a:r>
             <a:r>
-              <a:rPr lang="es-ES" dirty="0" smtClean="0"/>
+              <a:rPr lang="es-ES" dirty="0"/>
               <a:t> </a:t>
             </a:r>
             <a:r>
-              <a:rPr lang="es-ES" dirty="0" err="1" smtClean="0"/>
+              <a:rPr lang="es-ES" dirty="0" err="1"/>
               <a:t>dasar</a:t>
             </a:r>
             <a:r>
-              <a:rPr lang="es-ES" dirty="0" smtClean="0"/>
+              <a:rPr lang="es-ES" dirty="0"/>
               <a:t> </a:t>
             </a:r>
             <a:r>
-              <a:rPr lang="es-ES" dirty="0" err="1" smtClean="0"/>
+              <a:rPr lang="es-ES" dirty="0" err="1"/>
               <a:t>html</a:t>
             </a:r>
-            <a:endParaRPr lang="es-ES" dirty="0" smtClean="0"/>
+            <a:endParaRPr lang="es-ES" dirty="0"/>
           </a:p>
         </p:txBody>
       </p:sp>
@@ -20493,21 +20312,13 @@
               <a:t>en</a:t>
             </a:r>
             <a:r>
-              <a:rPr lang="en-US" sz="1200" dirty="0" smtClean="0">
+              <a:rPr lang="en-US" sz="1200" dirty="0">
                 <a:solidFill>
                   <a:schemeClr val="tx1"/>
                 </a:solidFill>
               </a:rPr>
               <a:t>"&gt;</a:t>
             </a:r>
-            <a:r>
-              <a:rPr lang="en-US" sz="1200" dirty="0">
-                <a:solidFill>
-                  <a:schemeClr val="tx1"/>
-                </a:solidFill>
-              </a:rPr>
-              <a:t/>
-            </a:r>
             <a:br>
               <a:rPr lang="en-US" sz="1200" dirty="0">
                 <a:solidFill>
@@ -20603,23 +20414,7 @@
                   <a:schemeClr val="tx1"/>
                 </a:solidFill>
               </a:rPr>
-              <a:t>&lt;/head</a:t>
-            </a:r>
-            <a:r>
-              <a:rPr lang="en-US" sz="1200" dirty="0" smtClean="0">
-                <a:solidFill>
-                  <a:schemeClr val="tx1"/>
-                </a:solidFill>
-              </a:rPr>
-              <a:t>&gt;</a:t>
-            </a:r>
-            <a:r>
-              <a:rPr lang="en-US" sz="1200" dirty="0">
-                <a:solidFill>
-                  <a:schemeClr val="tx1"/>
-                </a:solidFill>
-              </a:rPr>
-              <a:t/>
+              <a:t>&lt;/head&gt;</a:t>
             </a:r>
             <a:br>
               <a:rPr lang="en-US" sz="1200" dirty="0">
@@ -20634,23 +20429,7 @@
                   <a:schemeClr val="tx1"/>
                 </a:solidFill>
               </a:rPr>
-              <a:t>&lt;body</a:t>
-            </a:r>
-            <a:r>
-              <a:rPr lang="en-US" sz="1200" dirty="0" smtClean="0">
-                <a:solidFill>
-                  <a:schemeClr val="tx1"/>
-                </a:solidFill>
-              </a:rPr>
-              <a:t>&gt;</a:t>
-            </a:r>
-            <a:r>
-              <a:rPr lang="en-US" sz="1200" dirty="0">
-                <a:solidFill>
-                  <a:schemeClr val="tx1"/>
-                </a:solidFill>
-              </a:rPr>
-              <a:t/>
+              <a:t>&lt;body&gt;</a:t>
             </a:r>
             <a:br>
               <a:rPr lang="en-US" sz="1200" dirty="0">
@@ -20675,23 +20454,7 @@
                   <a:schemeClr val="tx1"/>
                 </a:solidFill>
               </a:rPr>
-              <a:t>&lt;footer</a:t>
-            </a:r>
-            <a:r>
-              <a:rPr lang="en-US" sz="1200" dirty="0" smtClean="0">
-                <a:solidFill>
-                  <a:schemeClr val="tx1"/>
-                </a:solidFill>
-              </a:rPr>
-              <a:t>&gt;</a:t>
-            </a:r>
-            <a:r>
-              <a:rPr lang="en-US" sz="1200" dirty="0">
-                <a:solidFill>
-                  <a:schemeClr val="tx1"/>
-                </a:solidFill>
-              </a:rPr>
-              <a:t/>
+              <a:t>&lt;footer&gt;</a:t>
             </a:r>
             <a:br>
               <a:rPr lang="en-US" sz="1200" dirty="0">
@@ -20706,23 +20469,7 @@
                   <a:schemeClr val="tx1"/>
                 </a:solidFill>
               </a:rPr>
-              <a:t>&lt;/footer</a:t>
-            </a:r>
-            <a:r>
-              <a:rPr lang="en-US" sz="1200" dirty="0" smtClean="0">
-                <a:solidFill>
-                  <a:schemeClr val="tx1"/>
-                </a:solidFill>
-              </a:rPr>
-              <a:t>&gt;</a:t>
-            </a:r>
-            <a:r>
-              <a:rPr lang="en-US" sz="1200" dirty="0">
-                <a:solidFill>
-                  <a:schemeClr val="tx1"/>
-                </a:solidFill>
-              </a:rPr>
-              <a:t/>
+              <a:t>&lt;/footer&gt;</a:t>
             </a:r>
             <a:br>
               <a:rPr lang="en-US" sz="1200" dirty="0">
@@ -20737,23 +20484,7 @@
                   <a:schemeClr val="tx1"/>
                 </a:solidFill>
               </a:rPr>
-              <a:t>&lt;/html</a:t>
-            </a:r>
-            <a:r>
-              <a:rPr lang="en-US" sz="1200" dirty="0" smtClean="0">
-                <a:solidFill>
-                  <a:schemeClr val="tx1"/>
-                </a:solidFill>
-              </a:rPr>
-              <a:t>&gt;</a:t>
-            </a:r>
-            <a:r>
-              <a:rPr lang="en-US" sz="1200" dirty="0">
-                <a:solidFill>
-                  <a:schemeClr val="tx1"/>
-                </a:solidFill>
-              </a:rPr>
-              <a:t/>
+              <a:t>&lt;/html&gt;</a:t>
             </a:r>
             <a:br>
               <a:rPr lang="en-US" sz="1200" dirty="0">
@@ -20976,71 +20707,71 @@
           </a:lstStyle>
           <a:p>
             <a:r>
-              <a:rPr lang="es-ES" dirty="0" smtClean="0"/>
+              <a:rPr lang="es-ES" dirty="0"/>
               <a:t>6. </a:t>
             </a:r>
             <a:r>
-              <a:rPr lang="es-ES" dirty="0" err="1" smtClean="0"/>
+              <a:rPr lang="es-ES" dirty="0" err="1"/>
               <a:t>Tambahkan</a:t>
             </a:r>
             <a:r>
-              <a:rPr lang="es-ES" dirty="0" smtClean="0"/>
+              <a:rPr lang="es-ES" dirty="0"/>
               <a:t> </a:t>
             </a:r>
             <a:r>
-              <a:rPr lang="es-ES" dirty="0" err="1" smtClean="0"/>
+              <a:rPr lang="es-ES" dirty="0" err="1"/>
               <a:t>tulisan</a:t>
             </a:r>
             <a:r>
-              <a:rPr lang="es-ES" dirty="0" smtClean="0"/>
+              <a:rPr lang="es-ES" dirty="0"/>
               <a:t> </a:t>
             </a:r>
             <a:r>
-              <a:rPr lang="es-ES" dirty="0" err="1" smtClean="0"/>
+              <a:rPr lang="es-ES" dirty="0" err="1"/>
               <a:t>seperti</a:t>
             </a:r>
             <a:r>
-              <a:rPr lang="es-ES" dirty="0" smtClean="0"/>
+              <a:rPr lang="es-ES" dirty="0"/>
               <a:t> </a:t>
             </a:r>
             <a:r>
-              <a:rPr lang="es-ES" dirty="0" err="1" smtClean="0"/>
+              <a:rPr lang="es-ES" dirty="0" err="1"/>
               <a:t>contoh</a:t>
             </a:r>
             <a:r>
-              <a:rPr lang="es-ES" dirty="0" smtClean="0"/>
+              <a:rPr lang="es-ES" dirty="0"/>
               <a:t> di </a:t>
             </a:r>
             <a:r>
-              <a:rPr lang="es-ES" dirty="0" err="1" smtClean="0"/>
+              <a:rPr lang="es-ES" dirty="0" err="1"/>
               <a:t>slide</a:t>
             </a:r>
             <a:r>
-              <a:rPr lang="es-ES" dirty="0" smtClean="0"/>
+              <a:rPr lang="es-ES" dirty="0"/>
               <a:t> 5 pada </a:t>
             </a:r>
             <a:r>
-              <a:rPr lang="es-ES" dirty="0" err="1" smtClean="0"/>
+              <a:rPr lang="es-ES" dirty="0" err="1"/>
               <a:t>tag</a:t>
             </a:r>
             <a:r>
-              <a:rPr lang="es-ES" dirty="0" smtClean="0"/>
+              <a:rPr lang="es-ES" dirty="0"/>
               <a:t> &lt;</a:t>
             </a:r>
             <a:r>
-              <a:rPr lang="es-ES" dirty="0" err="1" smtClean="0"/>
+              <a:rPr lang="es-ES" dirty="0" err="1"/>
               <a:t>body</a:t>
             </a:r>
             <a:r>
-              <a:rPr lang="es-ES" dirty="0" smtClean="0"/>
+              <a:rPr lang="es-ES" dirty="0"/>
               <a:t>&gt;&lt;/</a:t>
             </a:r>
             <a:r>
-              <a:rPr lang="es-ES" dirty="0" err="1" smtClean="0"/>
+              <a:rPr lang="es-ES" dirty="0" err="1"/>
               <a:t>body</a:t>
             </a:r>
             <a:r>
-              <a:rPr lang="es-ES" dirty="0" smtClean="0"/>
+              <a:rPr lang="es-ES" dirty="0"/>
               <a:t>&gt;</a:t>
             </a:r>
           </a:p>
@@ -21080,13 +20811,6 @@
   <p:clrMapOvr>
     <a:masterClrMapping/>
   </p:clrMapOvr>
-  <p:timing>
-    <p:tnLst>
-      <p:par>
-        <p:cTn id="1" dur="indefinite" restart="never" nodeType="tmRoot"/>
-      </p:par>
-    </p:tnLst>
-  </p:timing>
 </p:sld>
 </file>
 
@@ -21131,7 +20855,7 @@
           <a:lstStyle/>
           <a:p>
             <a:r>
-              <a:rPr lang="en-US" dirty="0" smtClean="0"/>
+              <a:rPr lang="en-US" dirty="0"/>
               <a:t>Styling</a:t>
             </a:r>
             <a:endParaRPr lang="en-US" b="0" dirty="0"/>
@@ -21161,13 +20885,8 @@
           <a:p>
             <a:r>
               <a:rPr lang="en-US" dirty="0"/>
-              <a:t>Static Web – </a:t>
-            </a:r>
-            <a:r>
-              <a:rPr lang="en-US" dirty="0" smtClean="0"/>
-              <a:t>Styling</a:t>
-            </a:r>
-            <a:endParaRPr lang="en-US" dirty="0"/>
+              <a:t>Static Web – Styling</a:t>
+            </a:r>
           </a:p>
         </p:txBody>
       </p:sp>
@@ -21487,94 +21206,86 @@
           <a:p>
             <a:r>
               <a:rPr lang="es-ES" dirty="0"/>
-              <a:t>7</a:t>
-            </a:r>
-            <a:r>
-              <a:rPr lang="es-ES" dirty="0" smtClean="0"/>
-              <a:t>. </a:t>
-            </a:r>
-            <a:r>
-              <a:rPr lang="es-ES" dirty="0" err="1" smtClean="0"/>
+              <a:t>7. </a:t>
+            </a:r>
+            <a:r>
+              <a:rPr lang="es-ES" dirty="0" err="1"/>
               <a:t>Import</a:t>
             </a:r>
             <a:r>
-              <a:rPr lang="es-ES" dirty="0" smtClean="0"/>
+              <a:rPr lang="es-ES" dirty="0"/>
               <a:t> file custom.css yang </a:t>
             </a:r>
             <a:r>
-              <a:rPr lang="es-ES" dirty="0" err="1" smtClean="0"/>
+              <a:rPr lang="es-ES" dirty="0" err="1"/>
               <a:t>telah</a:t>
             </a:r>
             <a:r>
-              <a:rPr lang="es-ES" dirty="0" smtClean="0"/>
+              <a:rPr lang="es-ES" dirty="0"/>
               <a:t> di </a:t>
             </a:r>
             <a:r>
-              <a:rPr lang="es-ES" dirty="0" err="1" smtClean="0"/>
+              <a:rPr lang="es-ES" dirty="0" err="1"/>
               <a:t>buat</a:t>
-            </a:r>
-            <a:r>
-              <a:rPr lang="es-ES" dirty="0" smtClean="0"/>
-              <a:t> </a:t>
-            </a:r>
-            <a:r>
-              <a:rPr lang="es-ES" dirty="0" err="1" smtClean="0"/>
-              <a:t>dengan</a:t>
-            </a:r>
-            <a:r>
-              <a:rPr lang="es-ES" dirty="0" smtClean="0"/>
-              <a:t> </a:t>
-            </a:r>
-            <a:r>
-              <a:rPr lang="es-ES" dirty="0" err="1" smtClean="0"/>
-              <a:t>menambahkan</a:t>
             </a:r>
             <a:r>
               <a:rPr lang="es-ES" dirty="0"/>
               <a:t> </a:t>
             </a:r>
             <a:r>
-              <a:rPr lang="es-ES" dirty="0" smtClean="0"/>
-              <a:t>link </a:t>
-            </a:r>
-            <a:r>
-              <a:rPr lang="es-ES" dirty="0" err="1" smtClean="0"/>
+              <a:rPr lang="es-ES" dirty="0" err="1"/>
+              <a:t>dengan</a:t>
+            </a:r>
+            <a:r>
+              <a:rPr lang="es-ES" dirty="0"/>
+              <a:t> </a:t>
+            </a:r>
+            <a:r>
+              <a:rPr lang="es-ES" dirty="0" err="1"/>
+              <a:t>menambahkan</a:t>
+            </a:r>
+            <a:r>
+              <a:rPr lang="es-ES" dirty="0"/>
+              <a:t> link </a:t>
+            </a:r>
+            <a:r>
+              <a:rPr lang="es-ES" dirty="0" err="1"/>
               <a:t>code</a:t>
             </a:r>
             <a:r>
-              <a:rPr lang="es-ES" dirty="0" smtClean="0"/>
+              <a:rPr lang="es-ES" dirty="0"/>
               <a:t> di </a:t>
             </a:r>
             <a:r>
-              <a:rPr lang="es-ES" dirty="0" err="1" smtClean="0"/>
+              <a:rPr lang="es-ES" dirty="0" err="1"/>
               <a:t>bawah</a:t>
             </a:r>
             <a:r>
-              <a:rPr lang="es-ES" dirty="0" smtClean="0"/>
+              <a:rPr lang="es-ES" dirty="0"/>
               <a:t> </a:t>
             </a:r>
             <a:r>
-              <a:rPr lang="es-ES" dirty="0" err="1" smtClean="0"/>
+              <a:rPr lang="es-ES" dirty="0" err="1"/>
               <a:t>ini</a:t>
             </a:r>
             <a:r>
-              <a:rPr lang="es-ES" dirty="0" smtClean="0"/>
+              <a:rPr lang="es-ES" dirty="0"/>
               <a:t> </a:t>
             </a:r>
             <a:r>
-              <a:rPr lang="es-ES" dirty="0" err="1" smtClean="0"/>
+              <a:rPr lang="es-ES" dirty="0" err="1"/>
               <a:t>dalam</a:t>
             </a:r>
             <a:r>
-              <a:rPr lang="es-ES" dirty="0" smtClean="0"/>
+              <a:rPr lang="es-ES" dirty="0"/>
               <a:t> </a:t>
             </a:r>
             <a:r>
-              <a:rPr lang="es-ES" dirty="0" err="1" smtClean="0"/>
+              <a:rPr lang="es-ES" dirty="0" err="1"/>
               <a:t>tag</a:t>
             </a:r>
             <a:r>
-              <a:rPr lang="es-ES" dirty="0" smtClean="0"/>
+              <a:rPr lang="es-ES" dirty="0"/>
               <a:t> &lt;head&gt;&lt;/head&gt;</a:t>
             </a:r>
           </a:p>
@@ -21659,21 +21370,8 @@
                   <a:schemeClr val="tx1"/>
                 </a:solidFill>
               </a:rPr>
-              <a:t>="stylesheet</a:t>
-            </a:r>
-            <a:r>
-              <a:rPr lang="en-US" dirty="0" smtClean="0">
-                <a:solidFill>
-                  <a:schemeClr val="tx1"/>
-                </a:solidFill>
-              </a:rPr>
-              <a:t>"&gt;</a:t>
-            </a:r>
-            <a:endParaRPr lang="en-US" dirty="0">
-              <a:solidFill>
-                <a:schemeClr val="tx1"/>
-              </a:solidFill>
-            </a:endParaRPr>
+              <a:t>="stylesheet"&gt;</a:t>
+            </a:r>
           </a:p>
         </p:txBody>
       </p:sp>
@@ -21883,111 +21581,111 @@
           </a:lstStyle>
           <a:p>
             <a:r>
-              <a:rPr lang="es-ES" dirty="0" smtClean="0"/>
+              <a:rPr lang="es-ES" dirty="0"/>
               <a:t>8. </a:t>
             </a:r>
             <a:r>
-              <a:rPr lang="es-ES" dirty="0" err="1" smtClean="0"/>
+              <a:rPr lang="es-ES" dirty="0" err="1"/>
               <a:t>Import</a:t>
             </a:r>
             <a:r>
-              <a:rPr lang="es-ES" dirty="0" smtClean="0"/>
+              <a:rPr lang="es-ES" dirty="0"/>
               <a:t> file custom.js yang </a:t>
             </a:r>
             <a:r>
-              <a:rPr lang="es-ES" dirty="0" err="1" smtClean="0"/>
+              <a:rPr lang="es-ES" dirty="0" err="1"/>
               <a:t>telah</a:t>
             </a:r>
             <a:r>
-              <a:rPr lang="es-ES" dirty="0" smtClean="0"/>
+              <a:rPr lang="es-ES" dirty="0"/>
               <a:t> di </a:t>
             </a:r>
             <a:r>
-              <a:rPr lang="es-ES" dirty="0" err="1" smtClean="0"/>
+              <a:rPr lang="es-ES" dirty="0" err="1"/>
               <a:t>buat</a:t>
-            </a:r>
-            <a:r>
-              <a:rPr lang="es-ES" dirty="0" smtClean="0"/>
-              <a:t> </a:t>
-            </a:r>
-            <a:r>
-              <a:rPr lang="es-ES" dirty="0" err="1" smtClean="0"/>
-              <a:t>dengan</a:t>
-            </a:r>
-            <a:r>
-              <a:rPr lang="es-ES" dirty="0" smtClean="0"/>
-              <a:t> </a:t>
-            </a:r>
-            <a:r>
-              <a:rPr lang="es-ES" dirty="0" err="1" smtClean="0"/>
-              <a:t>menambahkan</a:t>
             </a:r>
             <a:r>
               <a:rPr lang="es-ES" dirty="0"/>
               <a:t> </a:t>
             </a:r>
             <a:r>
-              <a:rPr lang="es-ES" dirty="0" err="1" smtClean="0"/>
+              <a:rPr lang="es-ES" dirty="0" err="1"/>
+              <a:t>dengan</a:t>
+            </a:r>
+            <a:r>
+              <a:rPr lang="es-ES" dirty="0"/>
+              <a:t> </a:t>
+            </a:r>
+            <a:r>
+              <a:rPr lang="es-ES" dirty="0" err="1"/>
+              <a:t>menambahkan</a:t>
+            </a:r>
+            <a:r>
+              <a:rPr lang="es-ES" dirty="0"/>
+              <a:t> </a:t>
+            </a:r>
+            <a:r>
+              <a:rPr lang="es-ES" dirty="0" err="1"/>
               <a:t>code</a:t>
             </a:r>
             <a:r>
-              <a:rPr lang="es-ES" dirty="0" smtClean="0"/>
+              <a:rPr lang="es-ES" dirty="0"/>
               <a:t> di </a:t>
             </a:r>
             <a:r>
-              <a:rPr lang="es-ES" dirty="0" err="1" smtClean="0"/>
+              <a:rPr lang="es-ES" dirty="0" err="1"/>
               <a:t>bawah</a:t>
             </a:r>
             <a:r>
-              <a:rPr lang="es-ES" dirty="0" smtClean="0"/>
+              <a:rPr lang="es-ES" dirty="0"/>
               <a:t> </a:t>
             </a:r>
             <a:r>
-              <a:rPr lang="es-ES" dirty="0" err="1" smtClean="0"/>
+              <a:rPr lang="es-ES" dirty="0" err="1"/>
               <a:t>ini</a:t>
             </a:r>
             <a:r>
-              <a:rPr lang="es-ES" dirty="0" smtClean="0"/>
+              <a:rPr lang="es-ES" dirty="0"/>
               <a:t> </a:t>
             </a:r>
             <a:r>
-              <a:rPr lang="es-ES" dirty="0" err="1" smtClean="0"/>
+              <a:rPr lang="es-ES" dirty="0" err="1"/>
               <a:t>ke</a:t>
             </a:r>
             <a:r>
-              <a:rPr lang="es-ES" dirty="0" smtClean="0"/>
+              <a:rPr lang="es-ES" dirty="0"/>
               <a:t> </a:t>
             </a:r>
             <a:r>
-              <a:rPr lang="es-ES" dirty="0" err="1" smtClean="0"/>
+              <a:rPr lang="es-ES" dirty="0" err="1"/>
               <a:t>dalam</a:t>
             </a:r>
             <a:r>
-              <a:rPr lang="es-ES" dirty="0" smtClean="0"/>
+              <a:rPr lang="es-ES" dirty="0"/>
               <a:t> </a:t>
             </a:r>
             <a:r>
-              <a:rPr lang="es-ES" dirty="0" err="1" smtClean="0"/>
+              <a:rPr lang="es-ES" dirty="0" err="1"/>
               <a:t>tag</a:t>
             </a:r>
             <a:r>
-              <a:rPr lang="es-ES" dirty="0" smtClean="0"/>
+              <a:rPr lang="es-ES" dirty="0"/>
               <a:t> &lt;</a:t>
             </a:r>
             <a:r>
-              <a:rPr lang="es-ES" dirty="0" err="1" smtClean="0"/>
+              <a:rPr lang="es-ES" dirty="0" err="1"/>
               <a:t>footer</a:t>
             </a:r>
             <a:r>
-              <a:rPr lang="es-ES" dirty="0" smtClean="0"/>
+              <a:rPr lang="es-ES" dirty="0"/>
               <a:t>&gt;&lt;/</a:t>
             </a:r>
             <a:r>
-              <a:rPr lang="es-ES" dirty="0" err="1" smtClean="0"/>
+              <a:rPr lang="es-ES" dirty="0" err="1"/>
               <a:t>footer</a:t>
             </a:r>
             <a:r>
-              <a:rPr lang="es-ES" dirty="0" smtClean="0"/>
+              <a:rPr lang="es-ES" dirty="0"/>
               <a:t>&gt;</a:t>
             </a:r>
           </a:p>
@@ -22119,13 +21817,6 @@
   <p:clrMapOvr>
     <a:masterClrMapping/>
   </p:clrMapOvr>
-  <p:timing>
-    <p:tnLst>
-      <p:par>
-        <p:cTn id="1" dur="indefinite" restart="never" nodeType="tmRoot"/>
-      </p:par>
-    </p:tnLst>
-  </p:timing>
 </p:sld>
 </file>
 
@@ -23192,20 +22883,20 @@
 </file>
 
 <file path=customXml/item2.xml><?xml version="1.0" encoding="utf-8"?>
+<p:properties xmlns:p="http://schemas.microsoft.com/office/2006/metadata/properties" xmlns:xsi="http://www.w3.org/2001/XMLSchema-instance" xmlns:pc="http://schemas.microsoft.com/office/infopath/2007/PartnerControls">
+  <documentManagement>
+    <MediaServiceKeyPoints xmlns="71af3243-3dd4-4a8d-8c0d-dd76da1f02a5" xsi:nil="true"/>
+  </documentManagement>
+</p:properties>
+</file>
+
+<file path=customXml/item3.xml><?xml version="1.0" encoding="utf-8"?>
 <?mso-contentType ?>
 <FormTemplates xmlns="http://schemas.microsoft.com/sharepoint/v3/contenttype/forms">
   <Display>DocumentLibraryForm</Display>
   <Edit>DocumentLibraryForm</Edit>
   <New>DocumentLibraryForm</New>
 </FormTemplates>
-</file>
-
-<file path=customXml/item3.xml><?xml version="1.0" encoding="utf-8"?>
-<p:properties xmlns:p="http://schemas.microsoft.com/office/2006/metadata/properties" xmlns:xsi="http://www.w3.org/2001/XMLSchema-instance" xmlns:pc="http://schemas.microsoft.com/office/infopath/2007/PartnerControls">
-  <documentManagement>
-    <MediaServiceKeyPoints xmlns="71af3243-3dd4-4a8d-8c0d-dd76da1f02a5" xsi:nil="true"/>
-  </documentManagement>
-</p:properties>
 </file>
 
 <file path=customXml/itemProps1.xml><?xml version="1.0" encoding="utf-8"?>
@@ -23228,14 +22919,6 @@
 </file>
 
 <file path=customXml/itemProps2.xml><?xml version="1.0" encoding="utf-8"?>
-<ds:datastoreItem xmlns:ds="http://schemas.openxmlformats.org/officeDocument/2006/customXml" ds:itemID="{A80A5AF1-8C57-4290-936E-5FD27C957251}">
-  <ds:schemaRefs>
-    <ds:schemaRef ds:uri="http://schemas.microsoft.com/sharepoint/v3/contenttype/forms"/>
-  </ds:schemaRefs>
-</ds:datastoreItem>
-</file>
-
-<file path=customXml/itemProps3.xml><?xml version="1.0" encoding="utf-8"?>
 <ds:datastoreItem xmlns:ds="http://schemas.openxmlformats.org/officeDocument/2006/customXml" ds:itemID="{C87F4215-C6BB-44A3-9A5E-9446E6835900}">
   <ds:schemaRefs>
     <ds:schemaRef ds:uri="http://schemas.microsoft.com/office/2006/metadata/properties"/>
@@ -23250,4 +22933,12 @@
     <ds:schemaRef ds:uri="http://www.w3.org/XML/1998/namespace"/>
   </ds:schemaRefs>
 </ds:datastoreItem>
+</file>
+
+<file path=customXml/itemProps3.xml><?xml version="1.0" encoding="utf-8"?>
+<ds:datastoreItem xmlns:ds="http://schemas.openxmlformats.org/officeDocument/2006/customXml" ds:itemID="{A80A5AF1-8C57-4290-936E-5FD27C957251}">
+  <ds:schemaRefs>
+    <ds:schemaRef ds:uri="http://schemas.microsoft.com/sharepoint/v3/contenttype/forms"/>
+  </ds:schemaRefs>
+</ds:datastoreItem>
 </file>
</xml_diff>